<commit_message>
Update How to hunt CVE-ID(s).pptx
</commit_message>
<xml_diff>
--- a/How to Hunt CVE-ID(s)/How to hunt CVE-ID(s).pptx
+++ b/How to Hunt CVE-ID(s)/How to hunt CVE-ID(s).pptx
@@ -4,6 +4,9 @@
   <p:sldMasterIdLst>
     <p:sldMasterId id="2147483648" r:id="rId1"/>
   </p:sldMasterIdLst>
+  <p:notesMasterIdLst>
+    <p:notesMasterId r:id="rId30"/>
+  </p:notesMasterIdLst>
   <p:sldIdLst>
     <p:sldId id="256" r:id="rId2"/>
     <p:sldId id="257" r:id="rId3"/>
@@ -16,20 +19,23 @@
     <p:sldId id="259" r:id="rId10"/>
     <p:sldId id="260" r:id="rId11"/>
     <p:sldId id="261" r:id="rId12"/>
-    <p:sldId id="267" r:id="rId13"/>
-    <p:sldId id="268" r:id="rId14"/>
-    <p:sldId id="269" r:id="rId15"/>
-    <p:sldId id="270" r:id="rId16"/>
-    <p:sldId id="271" r:id="rId17"/>
-    <p:sldId id="272" r:id="rId18"/>
-    <p:sldId id="273" r:id="rId19"/>
-    <p:sldId id="274" r:id="rId20"/>
-    <p:sldId id="275" r:id="rId21"/>
-    <p:sldId id="276" r:id="rId22"/>
-    <p:sldId id="277" r:id="rId23"/>
-    <p:sldId id="279" r:id="rId24"/>
-    <p:sldId id="280" r:id="rId25"/>
-    <p:sldId id="281" r:id="rId26"/>
+    <p:sldId id="284" r:id="rId13"/>
+    <p:sldId id="267" r:id="rId14"/>
+    <p:sldId id="268" r:id="rId15"/>
+    <p:sldId id="269" r:id="rId16"/>
+    <p:sldId id="282" r:id="rId17"/>
+    <p:sldId id="283" r:id="rId18"/>
+    <p:sldId id="270" r:id="rId19"/>
+    <p:sldId id="271" r:id="rId20"/>
+    <p:sldId id="272" r:id="rId21"/>
+    <p:sldId id="273" r:id="rId22"/>
+    <p:sldId id="274" r:id="rId23"/>
+    <p:sldId id="275" r:id="rId24"/>
+    <p:sldId id="276" r:id="rId25"/>
+    <p:sldId id="277" r:id="rId26"/>
+    <p:sldId id="279" r:id="rId27"/>
+    <p:sldId id="280" r:id="rId28"/>
+    <p:sldId id="281" r:id="rId29"/>
   </p:sldIdLst>
   <p:sldSz cx="12192000" cy="6858000"/>
   <p:notesSz cx="6858000" cy="9144000"/>
@@ -144,9 +150,12 @@
             <p14:sldId id="259"/>
             <p14:sldId id="260"/>
             <p14:sldId id="261"/>
+            <p14:sldId id="284"/>
             <p14:sldId id="267"/>
             <p14:sldId id="268"/>
             <p14:sldId id="269"/>
+            <p14:sldId id="282"/>
+            <p14:sldId id="283"/>
             <p14:sldId id="270"/>
             <p14:sldId id="271"/>
             <p14:sldId id="272"/>
@@ -167,6 +176,439 @@
     </p:ext>
   </p:extLst>
 </p:presentation>
+</file>
+
+<file path=ppt/notesMasters/notesMaster1.xml><?xml version="1.0" encoding="utf-8"?>
+<p:notesMaster xmlns:a="http://schemas.openxmlformats.org/drawingml/2006/main" xmlns:r="http://schemas.openxmlformats.org/officeDocument/2006/relationships" xmlns:p="http://schemas.openxmlformats.org/presentationml/2006/main">
+  <p:cSld>
+    <p:bg>
+      <p:bgRef idx="1001">
+        <a:schemeClr val="bg1"/>
+      </p:bgRef>
+    </p:bg>
+    <p:spTree>
+      <p:nvGrpSpPr>
+        <p:cNvPr id="1" name=""/>
+        <p:cNvGrpSpPr/>
+        <p:nvPr/>
+      </p:nvGrpSpPr>
+      <p:grpSpPr>
+        <a:xfrm>
+          <a:off x="0" y="0"/>
+          <a:ext cx="0" cy="0"/>
+          <a:chOff x="0" y="0"/>
+          <a:chExt cx="0" cy="0"/>
+        </a:xfrm>
+      </p:grpSpPr>
+      <p:sp>
+        <p:nvSpPr>
+          <p:cNvPr id="2" name="Header Placeholder 1"/>
+          <p:cNvSpPr>
+            <a:spLocks noGrp="1"/>
+          </p:cNvSpPr>
+          <p:nvPr>
+            <p:ph type="hdr" sz="quarter"/>
+          </p:nvPr>
+        </p:nvSpPr>
+        <p:spPr>
+          <a:xfrm>
+            <a:off x="0" y="0"/>
+            <a:ext cx="2971800" cy="458788"/>
+          </a:xfrm>
+          <a:prstGeom prst="rect">
+            <a:avLst/>
+          </a:prstGeom>
+        </p:spPr>
+        <p:txBody>
+          <a:bodyPr vert="horz" lIns="91440" tIns="45720" rIns="91440" bIns="45720" rtlCol="0"/>
+          <a:lstStyle>
+            <a:lvl1pPr algn="l">
+              <a:defRPr sz="1200"/>
+            </a:lvl1pPr>
+          </a:lstStyle>
+          <a:p>
+            <a:endParaRPr lang="en-US"/>
+          </a:p>
+        </p:txBody>
+      </p:sp>
+      <p:sp>
+        <p:nvSpPr>
+          <p:cNvPr id="3" name="Date Placeholder 2"/>
+          <p:cNvSpPr>
+            <a:spLocks noGrp="1"/>
+          </p:cNvSpPr>
+          <p:nvPr>
+            <p:ph type="dt" idx="1"/>
+          </p:nvPr>
+        </p:nvSpPr>
+        <p:spPr>
+          <a:xfrm>
+            <a:off x="3884613" y="0"/>
+            <a:ext cx="2971800" cy="458788"/>
+          </a:xfrm>
+          <a:prstGeom prst="rect">
+            <a:avLst/>
+          </a:prstGeom>
+        </p:spPr>
+        <p:txBody>
+          <a:bodyPr vert="horz" lIns="91440" tIns="45720" rIns="91440" bIns="45720" rtlCol="0"/>
+          <a:lstStyle>
+            <a:lvl1pPr algn="r">
+              <a:defRPr sz="1200"/>
+            </a:lvl1pPr>
+          </a:lstStyle>
+          <a:p>
+            <a:fld id="{AC502434-299E-463A-880D-EDD92FC122DC}" type="datetimeFigureOut">
+              <a:rPr lang="en-US" smtClean="0"/>
+              <a:t>10/8/2020</a:t>
+            </a:fld>
+            <a:endParaRPr lang="en-US"/>
+          </a:p>
+        </p:txBody>
+      </p:sp>
+      <p:sp>
+        <p:nvSpPr>
+          <p:cNvPr id="4" name="Slide Image Placeholder 3"/>
+          <p:cNvSpPr>
+            <a:spLocks noGrp="1" noRot="1" noChangeAspect="1"/>
+          </p:cNvSpPr>
+          <p:nvPr>
+            <p:ph type="sldImg" idx="2"/>
+          </p:nvPr>
+        </p:nvSpPr>
+        <p:spPr>
+          <a:xfrm>
+            <a:off x="685800" y="1143000"/>
+            <a:ext cx="5486400" cy="3086100"/>
+          </a:xfrm>
+          <a:prstGeom prst="rect">
+            <a:avLst/>
+          </a:prstGeom>
+          <a:noFill/>
+          <a:ln w="12700">
+            <a:solidFill>
+              <a:prstClr val="black"/>
+            </a:solidFill>
+          </a:ln>
+        </p:spPr>
+        <p:txBody>
+          <a:bodyPr vert="horz" lIns="91440" tIns="45720" rIns="91440" bIns="45720" rtlCol="0" anchor="ctr"/>
+          <a:lstStyle/>
+          <a:p>
+            <a:endParaRPr lang="en-US"/>
+          </a:p>
+        </p:txBody>
+      </p:sp>
+      <p:sp>
+        <p:nvSpPr>
+          <p:cNvPr id="5" name="Notes Placeholder 4"/>
+          <p:cNvSpPr>
+            <a:spLocks noGrp="1"/>
+          </p:cNvSpPr>
+          <p:nvPr>
+            <p:ph type="body" sz="quarter" idx="3"/>
+          </p:nvPr>
+        </p:nvSpPr>
+        <p:spPr>
+          <a:xfrm>
+            <a:off x="685800" y="4400550"/>
+            <a:ext cx="5486400" cy="3600450"/>
+          </a:xfrm>
+          <a:prstGeom prst="rect">
+            <a:avLst/>
+          </a:prstGeom>
+        </p:spPr>
+        <p:txBody>
+          <a:bodyPr vert="horz" lIns="91440" tIns="45720" rIns="91440" bIns="45720" rtlCol="0"/>
+          <a:lstStyle/>
+          <a:p>
+            <a:pPr lvl="0"/>
+            <a:r>
+              <a:rPr lang="en-US"/>
+              <a:t>Click to edit Master text styles</a:t>
+            </a:r>
+          </a:p>
+          <a:p>
+            <a:pPr lvl="1"/>
+            <a:r>
+              <a:rPr lang="en-US"/>
+              <a:t>Second level</a:t>
+            </a:r>
+          </a:p>
+          <a:p>
+            <a:pPr lvl="2"/>
+            <a:r>
+              <a:rPr lang="en-US"/>
+              <a:t>Third level</a:t>
+            </a:r>
+          </a:p>
+          <a:p>
+            <a:pPr lvl="3"/>
+            <a:r>
+              <a:rPr lang="en-US"/>
+              <a:t>Fourth level</a:t>
+            </a:r>
+          </a:p>
+          <a:p>
+            <a:pPr lvl="4"/>
+            <a:r>
+              <a:rPr lang="en-US"/>
+              <a:t>Fifth level</a:t>
+            </a:r>
+          </a:p>
+        </p:txBody>
+      </p:sp>
+      <p:sp>
+        <p:nvSpPr>
+          <p:cNvPr id="6" name="Footer Placeholder 5"/>
+          <p:cNvSpPr>
+            <a:spLocks noGrp="1"/>
+          </p:cNvSpPr>
+          <p:nvPr>
+            <p:ph type="ftr" sz="quarter" idx="4"/>
+          </p:nvPr>
+        </p:nvSpPr>
+        <p:spPr>
+          <a:xfrm>
+            <a:off x="0" y="8685213"/>
+            <a:ext cx="2971800" cy="458787"/>
+          </a:xfrm>
+          <a:prstGeom prst="rect">
+            <a:avLst/>
+          </a:prstGeom>
+        </p:spPr>
+        <p:txBody>
+          <a:bodyPr vert="horz" lIns="91440" tIns="45720" rIns="91440" bIns="45720" rtlCol="0" anchor="b"/>
+          <a:lstStyle>
+            <a:lvl1pPr algn="l">
+              <a:defRPr sz="1200"/>
+            </a:lvl1pPr>
+          </a:lstStyle>
+          <a:p>
+            <a:endParaRPr lang="en-US"/>
+          </a:p>
+        </p:txBody>
+      </p:sp>
+      <p:sp>
+        <p:nvSpPr>
+          <p:cNvPr id="7" name="Slide Number Placeholder 6"/>
+          <p:cNvSpPr>
+            <a:spLocks noGrp="1"/>
+          </p:cNvSpPr>
+          <p:nvPr>
+            <p:ph type="sldNum" sz="quarter" idx="5"/>
+          </p:nvPr>
+        </p:nvSpPr>
+        <p:spPr>
+          <a:xfrm>
+            <a:off x="3884613" y="8685213"/>
+            <a:ext cx="2971800" cy="458787"/>
+          </a:xfrm>
+          <a:prstGeom prst="rect">
+            <a:avLst/>
+          </a:prstGeom>
+        </p:spPr>
+        <p:txBody>
+          <a:bodyPr vert="horz" lIns="91440" tIns="45720" rIns="91440" bIns="45720" rtlCol="0" anchor="b"/>
+          <a:lstStyle>
+            <a:lvl1pPr algn="r">
+              <a:defRPr sz="1200"/>
+            </a:lvl1pPr>
+          </a:lstStyle>
+          <a:p>
+            <a:fld id="{964D5F3F-6CE1-452B-9CC2-D92490D62537}" type="slidenum">
+              <a:rPr lang="en-US" smtClean="0"/>
+              <a:t>‹#›</a:t>
+            </a:fld>
+            <a:endParaRPr lang="en-US"/>
+          </a:p>
+        </p:txBody>
+      </p:sp>
+    </p:spTree>
+    <p:extLst>
+      <p:ext uri="{BB962C8B-B14F-4D97-AF65-F5344CB8AC3E}">
+        <p14:creationId xmlns:p14="http://schemas.microsoft.com/office/powerpoint/2010/main" val="3313044152"/>
+      </p:ext>
+    </p:extLst>
+  </p:cSld>
+  <p:clrMap bg1="lt1" tx1="dk1" bg2="lt2" tx2="dk2" accent1="accent1" accent2="accent2" accent3="accent3" accent4="accent4" accent5="accent5" accent6="accent6" hlink="hlink" folHlink="folHlink"/>
+  <p:notesStyle>
+    <a:lvl1pPr marL="0" algn="l" defTabSz="914400" rtl="0" eaLnBrk="1" latinLnBrk="0" hangingPunct="1">
+      <a:defRPr sz="1200" kern="1200">
+        <a:solidFill>
+          <a:schemeClr val="tx1"/>
+        </a:solidFill>
+        <a:latin typeface="+mn-lt"/>
+        <a:ea typeface="+mn-ea"/>
+        <a:cs typeface="+mn-cs"/>
+      </a:defRPr>
+    </a:lvl1pPr>
+    <a:lvl2pPr marL="457200" algn="l" defTabSz="914400" rtl="0" eaLnBrk="1" latinLnBrk="0" hangingPunct="1">
+      <a:defRPr sz="1200" kern="1200">
+        <a:solidFill>
+          <a:schemeClr val="tx1"/>
+        </a:solidFill>
+        <a:latin typeface="+mn-lt"/>
+        <a:ea typeface="+mn-ea"/>
+        <a:cs typeface="+mn-cs"/>
+      </a:defRPr>
+    </a:lvl2pPr>
+    <a:lvl3pPr marL="914400" algn="l" defTabSz="914400" rtl="0" eaLnBrk="1" latinLnBrk="0" hangingPunct="1">
+      <a:defRPr sz="1200" kern="1200">
+        <a:solidFill>
+          <a:schemeClr val="tx1"/>
+        </a:solidFill>
+        <a:latin typeface="+mn-lt"/>
+        <a:ea typeface="+mn-ea"/>
+        <a:cs typeface="+mn-cs"/>
+      </a:defRPr>
+    </a:lvl3pPr>
+    <a:lvl4pPr marL="1371600" algn="l" defTabSz="914400" rtl="0" eaLnBrk="1" latinLnBrk="0" hangingPunct="1">
+      <a:defRPr sz="1200" kern="1200">
+        <a:solidFill>
+          <a:schemeClr val="tx1"/>
+        </a:solidFill>
+        <a:latin typeface="+mn-lt"/>
+        <a:ea typeface="+mn-ea"/>
+        <a:cs typeface="+mn-cs"/>
+      </a:defRPr>
+    </a:lvl4pPr>
+    <a:lvl5pPr marL="1828800" algn="l" defTabSz="914400" rtl="0" eaLnBrk="1" latinLnBrk="0" hangingPunct="1">
+      <a:defRPr sz="1200" kern="1200">
+        <a:solidFill>
+          <a:schemeClr val="tx1"/>
+        </a:solidFill>
+        <a:latin typeface="+mn-lt"/>
+        <a:ea typeface="+mn-ea"/>
+        <a:cs typeface="+mn-cs"/>
+      </a:defRPr>
+    </a:lvl5pPr>
+    <a:lvl6pPr marL="2286000" algn="l" defTabSz="914400" rtl="0" eaLnBrk="1" latinLnBrk="0" hangingPunct="1">
+      <a:defRPr sz="1200" kern="1200">
+        <a:solidFill>
+          <a:schemeClr val="tx1"/>
+        </a:solidFill>
+        <a:latin typeface="+mn-lt"/>
+        <a:ea typeface="+mn-ea"/>
+        <a:cs typeface="+mn-cs"/>
+      </a:defRPr>
+    </a:lvl6pPr>
+    <a:lvl7pPr marL="2743200" algn="l" defTabSz="914400" rtl="0" eaLnBrk="1" latinLnBrk="0" hangingPunct="1">
+      <a:defRPr sz="1200" kern="1200">
+        <a:solidFill>
+          <a:schemeClr val="tx1"/>
+        </a:solidFill>
+        <a:latin typeface="+mn-lt"/>
+        <a:ea typeface="+mn-ea"/>
+        <a:cs typeface="+mn-cs"/>
+      </a:defRPr>
+    </a:lvl7pPr>
+    <a:lvl8pPr marL="3200400" algn="l" defTabSz="914400" rtl="0" eaLnBrk="1" latinLnBrk="0" hangingPunct="1">
+      <a:defRPr sz="1200" kern="1200">
+        <a:solidFill>
+          <a:schemeClr val="tx1"/>
+        </a:solidFill>
+        <a:latin typeface="+mn-lt"/>
+        <a:ea typeface="+mn-ea"/>
+        <a:cs typeface="+mn-cs"/>
+      </a:defRPr>
+    </a:lvl8pPr>
+    <a:lvl9pPr marL="3657600" algn="l" defTabSz="914400" rtl="0" eaLnBrk="1" latinLnBrk="0" hangingPunct="1">
+      <a:defRPr sz="1200" kern="1200">
+        <a:solidFill>
+          <a:schemeClr val="tx1"/>
+        </a:solidFill>
+        <a:latin typeface="+mn-lt"/>
+        <a:ea typeface="+mn-ea"/>
+        <a:cs typeface="+mn-cs"/>
+      </a:defRPr>
+    </a:lvl9pPr>
+  </p:notesStyle>
+</p:notesMaster>
+</file>
+
+<file path=ppt/notesSlides/notesSlide1.xml><?xml version="1.0" encoding="utf-8"?>
+<p:notes xmlns:a="http://schemas.openxmlformats.org/drawingml/2006/main" xmlns:r="http://schemas.openxmlformats.org/officeDocument/2006/relationships" xmlns:p="http://schemas.openxmlformats.org/presentationml/2006/main">
+  <p:cSld>
+    <p:spTree>
+      <p:nvGrpSpPr>
+        <p:cNvPr id="1" name=""/>
+        <p:cNvGrpSpPr/>
+        <p:nvPr/>
+      </p:nvGrpSpPr>
+      <p:grpSpPr>
+        <a:xfrm>
+          <a:off x="0" y="0"/>
+          <a:ext cx="0" cy="0"/>
+          <a:chOff x="0" y="0"/>
+          <a:chExt cx="0" cy="0"/>
+        </a:xfrm>
+      </p:grpSpPr>
+      <p:sp>
+        <p:nvSpPr>
+          <p:cNvPr id="2" name="Slide Image Placeholder 1"/>
+          <p:cNvSpPr>
+            <a:spLocks noGrp="1" noRot="1" noChangeAspect="1"/>
+          </p:cNvSpPr>
+          <p:nvPr>
+            <p:ph type="sldImg"/>
+          </p:nvPr>
+        </p:nvSpPr>
+        <p:spPr/>
+      </p:sp>
+      <p:sp>
+        <p:nvSpPr>
+          <p:cNvPr id="3" name="Notes Placeholder 2"/>
+          <p:cNvSpPr>
+            <a:spLocks noGrp="1"/>
+          </p:cNvSpPr>
+          <p:nvPr>
+            <p:ph type="body" idx="1"/>
+          </p:nvPr>
+        </p:nvSpPr>
+        <p:spPr/>
+        <p:txBody>
+          <a:bodyPr/>
+          <a:lstStyle/>
+          <a:p>
+            <a:endParaRPr lang="en-US" dirty="0"/>
+          </a:p>
+        </p:txBody>
+      </p:sp>
+      <p:sp>
+        <p:nvSpPr>
+          <p:cNvPr id="4" name="Slide Number Placeholder 3"/>
+          <p:cNvSpPr>
+            <a:spLocks noGrp="1"/>
+          </p:cNvSpPr>
+          <p:nvPr>
+            <p:ph type="sldNum" sz="quarter" idx="5"/>
+          </p:nvPr>
+        </p:nvSpPr>
+        <p:spPr/>
+        <p:txBody>
+          <a:bodyPr/>
+          <a:lstStyle/>
+          <a:p>
+            <a:fld id="{964D5F3F-6CE1-452B-9CC2-D92490D62537}" type="slidenum">
+              <a:rPr lang="en-US" smtClean="0"/>
+              <a:t>16</a:t>
+            </a:fld>
+            <a:endParaRPr lang="en-US"/>
+          </a:p>
+        </p:txBody>
+      </p:sp>
+    </p:spTree>
+    <p:extLst>
+      <p:ext uri="{BB962C8B-B14F-4D97-AF65-F5344CB8AC3E}">
+        <p14:creationId xmlns:p14="http://schemas.microsoft.com/office/powerpoint/2010/main" val="2490731366"/>
+      </p:ext>
+    </p:extLst>
+  </p:cSld>
+  <p:clrMapOvr>
+    <a:masterClrMapping/>
+  </p:clrMapOvr>
+</p:notes>
 </file>
 
 <file path=ppt/slideLayouts/slideLayout1.xml><?xml version="1.0" encoding="utf-8"?>
@@ -501,7 +943,7 @@
             <a:fld id="{B61BEF0D-F0BB-DE4B-95CE-6DB70DBA9567}" type="datetimeFigureOut">
               <a:rPr lang="en-US" dirty="0"/>
               <a:pPr/>
-              <a:t>24/09/2020</a:t>
+              <a:t>10/8/2020</a:t>
             </a:fld>
             <a:endParaRPr lang="en-US" dirty="0"/>
           </a:p>
@@ -822,7 +1264,7 @@
             <a:fld id="{B61BEF0D-F0BB-DE4B-95CE-6DB70DBA9567}" type="datetimeFigureOut">
               <a:rPr lang="en-US" dirty="0"/>
               <a:pPr/>
-              <a:t>24/09/2020</a:t>
+              <a:t>10/8/2020</a:t>
             </a:fld>
             <a:endParaRPr lang="en-US" dirty="0"/>
           </a:p>
@@ -1067,7 +1509,7 @@
             <a:fld id="{B61BEF0D-F0BB-DE4B-95CE-6DB70DBA9567}" type="datetimeFigureOut">
               <a:rPr lang="en-US" dirty="0"/>
               <a:pPr/>
-              <a:t>24/09/2020</a:t>
+              <a:t>10/8/2020</a:t>
             </a:fld>
             <a:endParaRPr lang="en-US" dirty="0"/>
           </a:p>
@@ -1403,7 +1845,7 @@
             <a:fld id="{B61BEF0D-F0BB-DE4B-95CE-6DB70DBA9567}" type="datetimeFigureOut">
               <a:rPr lang="en-US" dirty="0"/>
               <a:pPr/>
-              <a:t>24/09/2020</a:t>
+              <a:t>10/8/2020</a:t>
             </a:fld>
             <a:endParaRPr lang="en-US" dirty="0"/>
           </a:p>
@@ -1747,7 +2189,7 @@
             <a:fld id="{B61BEF0D-F0BB-DE4B-95CE-6DB70DBA9567}" type="datetimeFigureOut">
               <a:rPr lang="en-US" dirty="0"/>
               <a:pPr/>
-              <a:t>24/09/2020</a:t>
+              <a:t>10/8/2020</a:t>
             </a:fld>
             <a:endParaRPr lang="en-US" dirty="0"/>
           </a:p>
@@ -2118,7 +2560,7 @@
             <a:fld id="{B61BEF0D-F0BB-DE4B-95CE-6DB70DBA9567}" type="datetimeFigureOut">
               <a:rPr lang="en-US" dirty="0"/>
               <a:pPr/>
-              <a:t>24/09/2020</a:t>
+              <a:t>10/8/2020</a:t>
             </a:fld>
             <a:endParaRPr lang="en-US" dirty="0"/>
           </a:p>
@@ -2585,7 +3027,7 @@
             <a:fld id="{B61BEF0D-F0BB-DE4B-95CE-6DB70DBA9567}" type="datetimeFigureOut">
               <a:rPr lang="en-US" dirty="0"/>
               <a:pPr/>
-              <a:t>24/09/2020</a:t>
+              <a:t>10/8/2020</a:t>
             </a:fld>
             <a:endParaRPr lang="en-US" dirty="0"/>
           </a:p>
@@ -2787,7 +3229,7 @@
             <a:fld id="{B61BEF0D-F0BB-DE4B-95CE-6DB70DBA9567}" type="datetimeFigureOut">
               <a:rPr lang="en-US" dirty="0"/>
               <a:pPr/>
-              <a:t>24/09/2020</a:t>
+              <a:t>10/8/2020</a:t>
             </a:fld>
             <a:endParaRPr lang="en-US" dirty="0"/>
           </a:p>
@@ -2995,7 +3437,7 @@
             <a:fld id="{B61BEF0D-F0BB-DE4B-95CE-6DB70DBA9567}" type="datetimeFigureOut">
               <a:rPr lang="en-US" dirty="0"/>
               <a:pPr/>
-              <a:t>24/09/2020</a:t>
+              <a:t>10/8/2020</a:t>
             </a:fld>
             <a:endParaRPr lang="en-US" dirty="0"/>
           </a:p>
@@ -3223,7 +3665,7 @@
           <a:p>
             <a:fld id="{05BFA754-D5C3-4E66-96A6-867B257F58DC}" type="datetimeFigureOut">
               <a:rPr lang="en-US" dirty="0"/>
-              <a:t>24/09/2020</a:t>
+              <a:t>10/8/2020</a:t>
             </a:fld>
             <a:endParaRPr lang="en-US" dirty="0"/>
           </a:p>
@@ -3467,7 +3909,7 @@
             <a:fld id="{B61BEF0D-F0BB-DE4B-95CE-6DB70DBA9567}" type="datetimeFigureOut">
               <a:rPr lang="en-US" dirty="0"/>
               <a:pPr/>
-              <a:t>24/09/2020</a:t>
+              <a:t>10/8/2020</a:t>
             </a:fld>
             <a:endParaRPr lang="en-US" dirty="0"/>
           </a:p>
@@ -3730,7 +4172,7 @@
           <a:p>
             <a:fld id="{05BFA754-D5C3-4E66-96A6-867B257F58DC}" type="datetimeFigureOut">
               <a:rPr lang="en-US" dirty="0"/>
-              <a:t>24/09/2020</a:t>
+              <a:t>10/8/2020</a:t>
             </a:fld>
             <a:endParaRPr lang="en-US" dirty="0"/>
           </a:p>
@@ -4139,7 +4581,7 @@
             <a:fld id="{B61BEF0D-F0BB-DE4B-95CE-6DB70DBA9567}" type="datetimeFigureOut">
               <a:rPr lang="en-US" dirty="0"/>
               <a:pPr/>
-              <a:t>24/09/2020</a:t>
+              <a:t>10/8/2020</a:t>
             </a:fld>
             <a:endParaRPr lang="en-US" dirty="0"/>
           </a:p>
@@ -4285,7 +4727,7 @@
             <a:fld id="{B61BEF0D-F0BB-DE4B-95CE-6DB70DBA9567}" type="datetimeFigureOut">
               <a:rPr lang="en-US" dirty="0"/>
               <a:pPr/>
-              <a:t>24/09/2020</a:t>
+              <a:t>10/8/2020</a:t>
             </a:fld>
             <a:endParaRPr lang="en-US" dirty="0"/>
           </a:p>
@@ -4408,7 +4850,7 @@
             <a:fld id="{B61BEF0D-F0BB-DE4B-95CE-6DB70DBA9567}" type="datetimeFigureOut">
               <a:rPr lang="en-US" dirty="0"/>
               <a:pPr/>
-              <a:t>24/09/2020</a:t>
+              <a:t>10/8/2020</a:t>
             </a:fld>
             <a:endParaRPr lang="en-US" dirty="0"/>
           </a:p>
@@ -4660,7 +5102,7 @@
             <a:fld id="{B61BEF0D-F0BB-DE4B-95CE-6DB70DBA9567}" type="datetimeFigureOut">
               <a:rPr lang="en-US" dirty="0"/>
               <a:pPr/>
-              <a:t>24/09/2020</a:t>
+              <a:t>10/8/2020</a:t>
             </a:fld>
             <a:endParaRPr lang="en-US" dirty="0"/>
           </a:p>
@@ -4972,7 +5414,7 @@
             <a:fld id="{B61BEF0D-F0BB-DE4B-95CE-6DB70DBA9567}" type="datetimeFigureOut">
               <a:rPr lang="en-US" dirty="0"/>
               <a:pPr/>
-              <a:t>24/09/2020</a:t>
+              <a:t>10/8/2020</a:t>
             </a:fld>
             <a:endParaRPr lang="en-US" dirty="0"/>
           </a:p>
@@ -5320,7 +5762,7 @@
             <a:fld id="{B61BEF0D-F0BB-DE4B-95CE-6DB70DBA9567}" type="datetimeFigureOut">
               <a:rPr lang="en-US" dirty="0"/>
               <a:pPr/>
-              <a:t>24/09/2020</a:t>
+              <a:t>10/8/2020</a:t>
             </a:fld>
             <a:endParaRPr lang="en-US" dirty="0"/>
           </a:p>
@@ -6267,7 +6709,7 @@
           <p:cNvPr id="2" name="Title 1">
             <a:extLst>
               <a:ext uri="{FF2B5EF4-FFF2-40B4-BE49-F238E27FC236}">
-                <a16:creationId xmlns:a16="http://schemas.microsoft.com/office/drawing/2014/main" id="{FEC44A4C-33D9-4317-9070-7BF7F0E7EBA7}"/>
+                <a16:creationId xmlns:a16="http://schemas.microsoft.com/office/drawing/2014/main" id="{D396743A-F742-46E9-A0A0-C1FF157B4E8E}"/>
               </a:ext>
             </a:extLst>
           </p:cNvPr>
@@ -6278,39 +6720,14 @@
             <p:ph type="title"/>
           </p:nvPr>
         </p:nvSpPr>
-        <p:spPr>
-          <a:xfrm>
-            <a:off x="1295401" y="982132"/>
-            <a:ext cx="9601196" cy="1303867"/>
-          </a:xfrm>
-        </p:spPr>
-        <p:txBody>
-          <a:bodyPr>
-            <a:normAutofit fontScale="90000"/>
-          </a:bodyPr>
+        <p:spPr/>
+        <p:txBody>
+          <a:bodyPr/>
           <a:lstStyle/>
           <a:p>
             <a:r>
-              <a:rPr lang="en-US" b="1" dirty="0">
-                <a:solidFill>
-                  <a:srgbClr val="92D050"/>
-                </a:solidFill>
-              </a:rPr>
-              <a:t>Continue </a:t>
-            </a:r>
-            <a:br>
-              <a:rPr lang="en-US" dirty="0"/>
-            </a:br>
-            <a:r>
-              <a:rPr lang="en-US" dirty="0"/>
-              <a:t>Demo Remote Code Execution</a:t>
-            </a:r>
-            <a:br>
-              <a:rPr lang="en-US" dirty="0"/>
-            </a:br>
-            <a:r>
-              <a:rPr lang="en-US" dirty="0"/>
-              <a:t>CVE-2020-11744</a:t>
+              <a:rPr lang="en-US" dirty="0"/>
+              <a:t>NOW FORGET ABOUT XSS</a:t>
             </a:r>
           </a:p>
         </p:txBody>
@@ -6320,7 +6737,7 @@
           <p:cNvPr id="3" name="Content Placeholder 2">
             <a:extLst>
               <a:ext uri="{FF2B5EF4-FFF2-40B4-BE49-F238E27FC236}">
-                <a16:creationId xmlns:a16="http://schemas.microsoft.com/office/drawing/2014/main" id="{4525E3D6-3C7A-4A67-9935-9CD342F884F6}"/>
+                <a16:creationId xmlns:a16="http://schemas.microsoft.com/office/drawing/2014/main" id="{B96C4C44-3F3C-49F4-88EE-7B5D2FAA519E}"/>
               </a:ext>
             </a:extLst>
           </p:cNvPr>
@@ -6333,141 +6750,230 @@
         </p:nvSpPr>
         <p:spPr/>
         <p:txBody>
-          <a:bodyPr>
+          <a:bodyPr/>
+          <a:lstStyle/>
+          <a:p>
+            <a:endParaRPr lang="en-US" dirty="0"/>
+          </a:p>
+        </p:txBody>
+      </p:sp>
+      <p:sp>
+        <p:nvSpPr>
+          <p:cNvPr id="4" name="Title 1">
+            <a:extLst>
+              <a:ext uri="{FF2B5EF4-FFF2-40B4-BE49-F238E27FC236}">
+                <a16:creationId xmlns:a16="http://schemas.microsoft.com/office/drawing/2014/main" id="{68C9A600-0C93-4A60-9FF6-36D5108B8823}"/>
+              </a:ext>
+            </a:extLst>
+          </p:cNvPr>
+          <p:cNvSpPr txBox="1">
+            <a:spLocks/>
+          </p:cNvSpPr>
+          <p:nvPr/>
+        </p:nvSpPr>
+        <p:spPr>
+          <a:xfrm>
+            <a:off x="1447802" y="2777066"/>
+            <a:ext cx="9601196" cy="1303867"/>
+          </a:xfrm>
+          <a:prstGeom prst="rect">
+            <a:avLst/>
+          </a:prstGeom>
+          <a:effectLst/>
+        </p:spPr>
+        <p:txBody>
+          <a:bodyPr vert="horz" lIns="91440" tIns="45720" rIns="91440" bIns="45720" rtlCol="0" anchor="ctr">
             <a:normAutofit fontScale="92500" lnSpcReduction="10000"/>
           </a:bodyPr>
-          <a:lstStyle/>
-          <a:p>
-            <a:r>
-              <a:rPr lang="en-US" sz="2000" dirty="0">
-                <a:solidFill>
-                  <a:schemeClr val="tx1"/>
-                </a:solidFill>
-              </a:rPr>
-              <a:t>VENDORS CLAIM THAT IT’S A FEATURE AND </a:t>
-            </a:r>
-            <a:r>
-              <a:rPr lang="en-US" sz="2000" b="1" dirty="0">
-                <a:solidFill>
-                  <a:srgbClr val="FF0000"/>
-                </a:solidFill>
-              </a:rPr>
-              <a:t>THEY DO NOT PLAN TO FIX</a:t>
-            </a:r>
-            <a:r>
-              <a:rPr lang="en-US" sz="2000" dirty="0"/>
-              <a:t>.</a:t>
-            </a:r>
-          </a:p>
-          <a:p>
-            <a:r>
-              <a:rPr lang="en-US" dirty="0"/>
-              <a:t>Below CVE ID still remain *RESERVED* status, meaning the writeup is not available for public yet.</a:t>
-            </a:r>
-            <a:br>
-              <a:rPr lang="en-US" dirty="0"/>
-            </a:br>
-            <a:r>
-              <a:rPr lang="en-US" dirty="0"/>
-              <a:t>But! Today, I will share some detail on </a:t>
-            </a:r>
-            <a:r>
-              <a:rPr lang="en-US" b="1" dirty="0">
-                <a:solidFill>
-                  <a:srgbClr val="FF0000"/>
-                </a:solidFill>
-              </a:rPr>
-              <a:t>CVE-2020-11744(RCE)</a:t>
-            </a:r>
-            <a:r>
-              <a:rPr lang="en-US" dirty="0"/>
-              <a:t> and </a:t>
-            </a:r>
-            <a:r>
-              <a:rPr lang="en-US" b="1" dirty="0">
-                <a:solidFill>
-                  <a:srgbClr val="FF0000"/>
-                </a:solidFill>
-              </a:rPr>
-              <a:t>chain it </a:t>
-            </a:r>
-            <a:r>
-              <a:rPr lang="en-US" dirty="0"/>
-              <a:t>with </a:t>
-            </a:r>
-            <a:r>
-              <a:rPr lang="en-US" b="1" dirty="0">
-                <a:solidFill>
-                  <a:srgbClr val="FF0000"/>
-                </a:solidFill>
-              </a:rPr>
-              <a:t>XSS (CVE-2020-11749)</a:t>
-            </a:r>
-            <a:r>
-              <a:rPr lang="en-US" dirty="0"/>
-              <a:t> to increase the XSS </a:t>
-            </a:r>
-            <a:r>
-              <a:rPr lang="en-US"/>
-              <a:t>CVSS score and </a:t>
-            </a:r>
-            <a:r>
-              <a:rPr lang="en-US" dirty="0"/>
-              <a:t>severity.</a:t>
-            </a:r>
-          </a:p>
-          <a:p>
-            <a:r>
-              <a:rPr lang="en-US" dirty="0"/>
-              <a:t>CVE-2020-11746 | File Upload to RCE</a:t>
-            </a:r>
-          </a:p>
-          <a:p>
-            <a:r>
-              <a:rPr lang="en-US" dirty="0"/>
-              <a:t>CVE-2020-11745 | MIB File Upload to RCE</a:t>
-            </a:r>
-          </a:p>
-          <a:p>
-            <a:r>
-              <a:rPr lang="en-US" b="1" dirty="0">
-                <a:solidFill>
-                  <a:srgbClr val="FF0000"/>
-                </a:solidFill>
-              </a:rPr>
-              <a:t>CVE-2020-11744 </a:t>
-            </a:r>
-            <a:r>
-              <a:rPr lang="en-US" b="1" dirty="0"/>
-              <a:t>| Running Plug-in </a:t>
-            </a:r>
-            <a:r>
-              <a:rPr lang="en-US" dirty="0"/>
-              <a:t>to RCE </a:t>
-            </a:r>
-            <a:endParaRPr lang="en-US" b="1" dirty="0"/>
-          </a:p>
-          <a:p>
-            <a:pPr marL="0" indent="0">
-              <a:buNone/>
-            </a:pPr>
-            <a:endParaRPr lang="en-US" dirty="0"/>
-          </a:p>
-          <a:p>
-            <a:endParaRPr lang="en-US" dirty="0"/>
+          <a:lstStyle>
+            <a:lvl1pPr algn="ctr" defTabSz="457200" rtl="0" eaLnBrk="1" latinLnBrk="0" hangingPunct="1">
+              <a:spcBef>
+                <a:spcPct val="0"/>
+              </a:spcBef>
+              <a:buNone/>
+              <a:defRPr sz="4400" kern="1200" cap="none">
+                <a:ln w="3175" cmpd="sng">
+                  <a:noFill/>
+                </a:ln>
+                <a:solidFill>
+                  <a:schemeClr val="tx1">
+                    <a:lumMod val="85000"/>
+                    <a:lumOff val="15000"/>
+                  </a:schemeClr>
+                </a:solidFill>
+                <a:effectLst/>
+                <a:latin typeface="+mj-lt"/>
+                <a:ea typeface="+mj-ea"/>
+                <a:cs typeface="+mj-cs"/>
+              </a:defRPr>
+            </a:lvl1pPr>
+            <a:lvl2pPr eaLnBrk="1" hangingPunct="1">
+              <a:defRPr>
+                <a:solidFill>
+                  <a:schemeClr val="tx2"/>
+                </a:solidFill>
+              </a:defRPr>
+            </a:lvl2pPr>
+            <a:lvl3pPr eaLnBrk="1" hangingPunct="1">
+              <a:defRPr>
+                <a:solidFill>
+                  <a:schemeClr val="tx2"/>
+                </a:solidFill>
+              </a:defRPr>
+            </a:lvl3pPr>
+            <a:lvl4pPr eaLnBrk="1" hangingPunct="1">
+              <a:defRPr>
+                <a:solidFill>
+                  <a:schemeClr val="tx2"/>
+                </a:solidFill>
+              </a:defRPr>
+            </a:lvl4pPr>
+            <a:lvl5pPr eaLnBrk="1" hangingPunct="1">
+              <a:defRPr>
+                <a:solidFill>
+                  <a:schemeClr val="tx2"/>
+                </a:solidFill>
+              </a:defRPr>
+            </a:lvl5pPr>
+            <a:lvl6pPr eaLnBrk="1" hangingPunct="1">
+              <a:defRPr>
+                <a:solidFill>
+                  <a:schemeClr val="tx2"/>
+                </a:solidFill>
+              </a:defRPr>
+            </a:lvl6pPr>
+            <a:lvl7pPr eaLnBrk="1" hangingPunct="1">
+              <a:defRPr>
+                <a:solidFill>
+                  <a:schemeClr val="tx2"/>
+                </a:solidFill>
+              </a:defRPr>
+            </a:lvl7pPr>
+            <a:lvl8pPr eaLnBrk="1" hangingPunct="1">
+              <a:defRPr>
+                <a:solidFill>
+                  <a:schemeClr val="tx2"/>
+                </a:solidFill>
+              </a:defRPr>
+            </a:lvl8pPr>
+            <a:lvl9pPr eaLnBrk="1" hangingPunct="1">
+              <a:defRPr>
+                <a:solidFill>
+                  <a:schemeClr val="tx2"/>
+                </a:solidFill>
+              </a:defRPr>
+            </a:lvl9pPr>
+          </a:lstStyle>
+          <a:p>
+            <a:r>
+              <a:rPr lang="en-US" dirty="0"/>
+              <a:t>and </a:t>
+            </a:r>
+          </a:p>
+          <a:p>
+            <a:r>
+              <a:rPr lang="en-US" dirty="0"/>
+              <a:t>Look/Focus for RCE </a:t>
+            </a:r>
           </a:p>
         </p:txBody>
       </p:sp>
     </p:spTree>
     <p:extLst>
       <p:ext uri="{BB962C8B-B14F-4D97-AF65-F5344CB8AC3E}">
-        <p14:creationId xmlns:p14="http://schemas.microsoft.com/office/powerpoint/2010/main" val="1398045374"/>
+        <p14:creationId xmlns:p14="http://schemas.microsoft.com/office/powerpoint/2010/main" val="939087479"/>
       </p:ext>
     </p:extLst>
   </p:cSld>
   <p:clrMapOvr>
     <a:masterClrMapping/>
   </p:clrMapOvr>
+  <p:timing>
+    <p:tnLst>
+      <p:par>
+        <p:cTn id="1" dur="indefinite" restart="never" nodeType="tmRoot">
+          <p:childTnLst>
+            <p:seq concurrent="1" nextAc="seek">
+              <p:cTn id="2" dur="indefinite" nodeType="mainSeq">
+                <p:childTnLst>
+                  <p:par>
+                    <p:cTn id="3" fill="hold">
+                      <p:stCondLst>
+                        <p:cond delay="indefinite"/>
+                      </p:stCondLst>
+                      <p:childTnLst>
+                        <p:par>
+                          <p:cTn id="4" fill="hold">
+                            <p:stCondLst>
+                              <p:cond delay="0"/>
+                            </p:stCondLst>
+                            <p:childTnLst>
+                              <p:par>
+                                <p:cTn id="5" presetID="22" presetClass="entr" presetSubtype="4" fill="hold" grpId="0" nodeType="clickEffect">
+                                  <p:stCondLst>
+                                    <p:cond delay="0"/>
+                                  </p:stCondLst>
+                                  <p:childTnLst>
+                                    <p:set>
+                                      <p:cBhvr>
+                                        <p:cTn id="6" dur="1" fill="hold">
+                                          <p:stCondLst>
+                                            <p:cond delay="0"/>
+                                          </p:stCondLst>
+                                        </p:cTn>
+                                        <p:tgtEl>
+                                          <p:spTgt spid="4"/>
+                                        </p:tgtEl>
+                                        <p:attrNameLst>
+                                          <p:attrName>style.visibility</p:attrName>
+                                        </p:attrNameLst>
+                                      </p:cBhvr>
+                                      <p:to>
+                                        <p:strVal val="visible"/>
+                                      </p:to>
+                                    </p:set>
+                                    <p:animEffect transition="in" filter="wipe(down)">
+                                      <p:cBhvr>
+                                        <p:cTn id="7" dur="500"/>
+                                        <p:tgtEl>
+                                          <p:spTgt spid="4"/>
+                                        </p:tgtEl>
+                                      </p:cBhvr>
+                                    </p:animEffect>
+                                  </p:childTnLst>
+                                </p:cTn>
+                              </p:par>
+                            </p:childTnLst>
+                          </p:cTn>
+                        </p:par>
+                      </p:childTnLst>
+                    </p:cTn>
+                  </p:par>
+                </p:childTnLst>
+              </p:cTn>
+              <p:prevCondLst>
+                <p:cond evt="onPrev" delay="0">
+                  <p:tgtEl>
+                    <p:sldTgt/>
+                  </p:tgtEl>
+                </p:cond>
+              </p:prevCondLst>
+              <p:nextCondLst>
+                <p:cond evt="onNext" delay="0">
+                  <p:tgtEl>
+                    <p:sldTgt/>
+                  </p:tgtEl>
+                </p:cond>
+              </p:nextCondLst>
+            </p:seq>
+          </p:childTnLst>
+        </p:cTn>
+      </p:par>
+    </p:tnLst>
+    <p:bldLst>
+      <p:bldP spid="4" grpId="0"/>
+    </p:bldLst>
+  </p:timing>
 </p:sld>
 </file>
 
@@ -6493,7 +6999,7 @@
           <p:cNvPr id="2" name="Title 1">
             <a:extLst>
               <a:ext uri="{FF2B5EF4-FFF2-40B4-BE49-F238E27FC236}">
-                <a16:creationId xmlns:a16="http://schemas.microsoft.com/office/drawing/2014/main" id="{51CD676F-6A6C-4777-B9E4-F6596BCA6048}"/>
+                <a16:creationId xmlns:a16="http://schemas.microsoft.com/office/drawing/2014/main" id="{FEC44A4C-33D9-4317-9070-7BF7F0E7EBA7}"/>
               </a:ext>
             </a:extLst>
           </p:cNvPr>
@@ -6504,14 +7010,39 @@
             <p:ph type="title"/>
           </p:nvPr>
         </p:nvSpPr>
-        <p:spPr/>
-        <p:txBody>
-          <a:bodyPr/>
+        <p:spPr>
+          <a:xfrm>
+            <a:off x="1295401" y="982132"/>
+            <a:ext cx="9601196" cy="1303867"/>
+          </a:xfrm>
+        </p:spPr>
+        <p:txBody>
+          <a:bodyPr>
+            <a:normAutofit fontScale="90000"/>
+          </a:bodyPr>
           <a:lstStyle/>
           <a:p>
             <a:r>
-              <a:rPr lang="en-US" dirty="0"/>
-              <a:t>Chain XSS and RCE together</a:t>
+              <a:rPr lang="en-US" b="1" dirty="0">
+                <a:solidFill>
+                  <a:srgbClr val="92D050"/>
+                </a:solidFill>
+              </a:rPr>
+              <a:t>Continue </a:t>
+            </a:r>
+            <a:br>
+              <a:rPr lang="en-US" dirty="0"/>
+            </a:br>
+            <a:r>
+              <a:rPr lang="en-US" dirty="0"/>
+              <a:t>Demo Remote Code Execution</a:t>
+            </a:r>
+            <a:br>
+              <a:rPr lang="en-US" dirty="0"/>
+            </a:br>
+            <a:r>
+              <a:rPr lang="en-US" dirty="0"/>
+              <a:t>CVE-2020-11744</a:t>
             </a:r>
           </a:p>
         </p:txBody>
@@ -6521,7 +7052,7 @@
           <p:cNvPr id="3" name="Content Placeholder 2">
             <a:extLst>
               <a:ext uri="{FF2B5EF4-FFF2-40B4-BE49-F238E27FC236}">
-                <a16:creationId xmlns:a16="http://schemas.microsoft.com/office/drawing/2014/main" id="{FB7968B4-CF58-4C35-941B-A64DB7C00E2F}"/>
+                <a16:creationId xmlns:a16="http://schemas.microsoft.com/office/drawing/2014/main" id="{4525E3D6-3C7A-4A67-9935-9CD342F884F6}"/>
               </a:ext>
             </a:extLst>
           </p:cNvPr>
@@ -6534,40 +7065,124 @@
         </p:nvSpPr>
         <p:spPr/>
         <p:txBody>
-          <a:bodyPr/>
+          <a:bodyPr>
+            <a:normAutofit fontScale="92500" lnSpcReduction="10000"/>
+          </a:bodyPr>
           <a:lstStyle/>
           <a:p>
             <a:r>
+              <a:rPr lang="en-US" sz="2000" dirty="0">
+                <a:solidFill>
+                  <a:schemeClr val="tx1"/>
+                </a:solidFill>
+              </a:rPr>
+              <a:t>VENDORS CLAIM THAT IT’S A FEATURE AND </a:t>
+            </a:r>
+            <a:r>
+              <a:rPr lang="en-US" sz="2000" b="1" dirty="0">
+                <a:solidFill>
+                  <a:srgbClr val="FF0000"/>
+                </a:solidFill>
+              </a:rPr>
+              <a:t>THEY DO NOT PLAN TO FIX</a:t>
+            </a:r>
+            <a:r>
+              <a:rPr lang="en-US" sz="2000" dirty="0"/>
+              <a:t>.</a:t>
+            </a:r>
+          </a:p>
+          <a:p>
+            <a:r>
+              <a:rPr lang="en-US" dirty="0"/>
+              <a:t>Below CVE ID still remain *RESERVED* status, meaning the writeup is not available for public yet.</a:t>
+            </a:r>
+            <a:br>
+              <a:rPr lang="en-US" dirty="0"/>
+            </a:br>
+            <a:r>
+              <a:rPr lang="en-US" dirty="0"/>
+              <a:t>But! Today, I will share some detail on </a:t>
+            </a:r>
+            <a:r>
+              <a:rPr lang="en-US" b="1" dirty="0">
+                <a:solidFill>
+                  <a:srgbClr val="FF0000"/>
+                </a:solidFill>
+              </a:rPr>
+              <a:t>CVE-2020-11744(RCE)</a:t>
+            </a:r>
+            <a:r>
+              <a:rPr lang="en-US" dirty="0"/>
+              <a:t> and </a:t>
+            </a:r>
+            <a:r>
+              <a:rPr lang="en-US" b="1" dirty="0">
+                <a:solidFill>
+                  <a:srgbClr val="FF0000"/>
+                </a:solidFill>
+              </a:rPr>
+              <a:t>chain it </a:t>
+            </a:r>
+            <a:r>
+              <a:rPr lang="en-US" dirty="0"/>
+              <a:t>with </a:t>
+            </a:r>
+            <a:r>
+              <a:rPr lang="en-US" b="1" dirty="0">
+                <a:solidFill>
+                  <a:srgbClr val="FF0000"/>
+                </a:solidFill>
+              </a:rPr>
+              <a:t>XSS (CVE-2020-11749)</a:t>
+            </a:r>
+            <a:r>
+              <a:rPr lang="en-US" dirty="0"/>
+              <a:t> to increase the XSS </a:t>
+            </a:r>
+            <a:r>
+              <a:rPr lang="en-US"/>
+              <a:t>CVSS score and </a:t>
+            </a:r>
+            <a:r>
+              <a:rPr lang="en-US" dirty="0"/>
+              <a:t>severity.</a:t>
+            </a:r>
+          </a:p>
+          <a:p>
+            <a:r>
+              <a:rPr lang="en-US" dirty="0"/>
+              <a:t>CVE-2020-11746 | File Upload to RCE</a:t>
+            </a:r>
+          </a:p>
+          <a:p>
+            <a:r>
+              <a:rPr lang="en-US" dirty="0"/>
+              <a:t>CVE-2020-11745 | MIB File Upload to RCE</a:t>
+            </a:r>
+          </a:p>
+          <a:p>
+            <a:r>
+              <a:rPr lang="en-US" b="1" dirty="0">
+                <a:solidFill>
+                  <a:srgbClr val="FF0000"/>
+                </a:solidFill>
+              </a:rPr>
+              <a:t>CVE-2020-11744 </a:t>
+            </a:r>
+            <a:r>
               <a:rPr lang="en-US" b="1" dirty="0"/>
-              <a:t>Proof of Concept can be found </a:t>
-            </a:r>
-            <a:r>
-              <a:rPr lang="en-US" dirty="0"/>
-              <a:t> </a:t>
-            </a:r>
+              <a:t>| Running Plug-in </a:t>
+            </a:r>
+            <a:r>
+              <a:rPr lang="en-US" dirty="0"/>
+              <a:t>to RCE </a:t>
+            </a:r>
+            <a:endParaRPr lang="en-US" b="1" dirty="0"/>
           </a:p>
           <a:p>
             <a:pPr marL="0" indent="0">
               <a:buNone/>
             </a:pPr>
-            <a:r>
-              <a:rPr lang="en-US" dirty="0">
-                <a:hlinkClick r:id="rId2"/>
-              </a:rPr>
-              <a:t>https://www.exploit-db.com/exploits/48707</a:t>
-            </a:r>
-            <a:endParaRPr lang="en-US" dirty="0"/>
-          </a:p>
-          <a:p>
-            <a:pPr marL="0" indent="0">
-              <a:buNone/>
-            </a:pPr>
-            <a:r>
-              <a:rPr lang="en-US" dirty="0">
-                <a:hlinkClick r:id="rId3"/>
-              </a:rPr>
-              <a:t>https://packetstormsecurity.com/files/158389/Pandora-FMS-7.0-NG-746-Script-Insertion-Code-Execution.htmlPoC</a:t>
-            </a:r>
             <a:endParaRPr lang="en-US" dirty="0"/>
           </a:p>
           <a:p>
@@ -6578,7 +7193,7 @@
     </p:spTree>
     <p:extLst>
       <p:ext uri="{BB962C8B-B14F-4D97-AF65-F5344CB8AC3E}">
-        <p14:creationId xmlns:p14="http://schemas.microsoft.com/office/powerpoint/2010/main" val="3066563092"/>
+        <p14:creationId xmlns:p14="http://schemas.microsoft.com/office/powerpoint/2010/main" val="1398045374"/>
       </p:ext>
     </p:extLst>
   </p:cSld>
@@ -6610,7 +7225,7 @@
           <p:cNvPr id="2" name="Title 1">
             <a:extLst>
               <a:ext uri="{FF2B5EF4-FFF2-40B4-BE49-F238E27FC236}">
-                <a16:creationId xmlns:a16="http://schemas.microsoft.com/office/drawing/2014/main" id="{07E48E60-C237-4A81-8A9C-82EA6859FB54}"/>
+                <a16:creationId xmlns:a16="http://schemas.microsoft.com/office/drawing/2014/main" id="{51CD676F-6A6C-4777-B9E4-F6596BCA6048}"/>
               </a:ext>
             </a:extLst>
           </p:cNvPr>
@@ -6621,21 +7236,14 @@
             <p:ph type="title"/>
           </p:nvPr>
         </p:nvSpPr>
-        <p:spPr>
-          <a:xfrm>
-            <a:off x="1295402" y="982132"/>
-            <a:ext cx="9601196" cy="1303867"/>
-          </a:xfrm>
-        </p:spPr>
-        <p:txBody>
-          <a:bodyPr>
-            <a:normAutofit/>
-          </a:bodyPr>
+        <p:spPr/>
+        <p:txBody>
+          <a:bodyPr/>
           <a:lstStyle/>
           <a:p>
             <a:r>
               <a:rPr lang="en-US" dirty="0"/>
-              <a:t>Demo CVE-2020-11749</a:t>
+              <a:t>Chain XSS and RCE together</a:t>
             </a:r>
           </a:p>
         </p:txBody>
@@ -6645,7 +7253,7 @@
           <p:cNvPr id="3" name="Content Placeholder 2">
             <a:extLst>
               <a:ext uri="{FF2B5EF4-FFF2-40B4-BE49-F238E27FC236}">
-                <a16:creationId xmlns:a16="http://schemas.microsoft.com/office/drawing/2014/main" id="{6880B6D7-3236-45D4-B256-AC73C5D33F5D}"/>
+                <a16:creationId xmlns:a16="http://schemas.microsoft.com/office/drawing/2014/main" id="{FB7968B4-CF58-4C35-941B-A64DB7C00E2F}"/>
               </a:ext>
             </a:extLst>
           </p:cNvPr>
@@ -6658,100 +7266,43 @@
         </p:nvSpPr>
         <p:spPr/>
         <p:txBody>
-          <a:bodyPr>
-            <a:normAutofit fontScale="85000" lnSpcReduction="20000"/>
-          </a:bodyPr>
+          <a:bodyPr/>
           <a:lstStyle/>
           <a:p>
             <a:r>
-              <a:rPr lang="en-US" dirty="0"/>
-              <a:t>Timeline</a:t>
-            </a:r>
-          </a:p>
-          <a:p>
-            <a:pPr lvl="1"/>
-            <a:r>
-              <a:rPr lang="en-US" dirty="0"/>
-              <a:t>14/04/2020 Request CVE </a:t>
-            </a:r>
-            <a:r>
-              <a:rPr lang="en-US" dirty="0" err="1"/>
-              <a:t>Mitre</a:t>
+              <a:rPr lang="en-US" b="1" dirty="0"/>
+              <a:t>Proof of Concept can be found </a:t>
+            </a:r>
+            <a:r>
+              <a:rPr lang="en-US" dirty="0"/>
+              <a:t> </a:t>
+            </a:r>
+          </a:p>
+          <a:p>
+            <a:pPr marL="0" indent="0">
+              <a:buNone/>
+            </a:pPr>
+            <a:r>
+              <a:rPr lang="en-US" dirty="0">
+                <a:hlinkClick r:id="rId2"/>
+              </a:rPr>
+              <a:t>https://www.exploit-db.com/exploits/48707</a:t>
             </a:r>
             <a:endParaRPr lang="en-US" dirty="0"/>
           </a:p>
           <a:p>
-            <a:pPr lvl="1"/>
-            <a:r>
-              <a:rPr lang="en-US" dirty="0"/>
-              <a:t>15/04/2020 CVE-ID Assigned with *Disputed*, vendor doesn’t agree</a:t>
-            </a:r>
-          </a:p>
-          <a:p>
-            <a:pPr lvl="1"/>
-            <a:r>
-              <a:rPr lang="en-US" dirty="0"/>
-              <a:t>15/04/2020 Email vendors no reply</a:t>
-            </a:r>
-          </a:p>
-          <a:p>
-            <a:pPr lvl="1"/>
-            <a:r>
-              <a:rPr lang="en-US" dirty="0"/>
-              <a:t> 4/06/2020   Disclose on Twitter and </a:t>
-            </a:r>
-            <a:r>
-              <a:rPr lang="en-US" dirty="0" err="1"/>
-              <a:t>Linkedin</a:t>
+            <a:pPr marL="0" indent="0">
+              <a:buNone/>
+            </a:pPr>
+            <a:r>
+              <a:rPr lang="en-US" dirty="0">
+                <a:hlinkClick r:id="rId3"/>
+              </a:rPr>
+              <a:t>https://packetstormsecurity.com/files/158389/Pandora-FMS-7.0-NG-746-Script-Insertion-Code-Execution.htmlPoC</a:t>
             </a:r>
             <a:endParaRPr lang="en-US" dirty="0"/>
           </a:p>
           <a:p>
-            <a:pPr lvl="1"/>
-            <a:r>
-              <a:rPr lang="en-US" dirty="0"/>
-              <a:t> 5/06/2020  </a:t>
-            </a:r>
-            <a:r>
-              <a:rPr lang="en-US" dirty="0" err="1"/>
-              <a:t>PandoraFMS</a:t>
-            </a:r>
-            <a:r>
-              <a:rPr lang="en-US" dirty="0"/>
-              <a:t> replied</a:t>
-            </a:r>
-          </a:p>
-          <a:p>
-            <a:pPr lvl="1"/>
-            <a:r>
-              <a:rPr lang="en-US" dirty="0"/>
-              <a:t> 9/07/2020   Patch release with release notes </a:t>
-            </a:r>
-          </a:p>
-          <a:p>
-            <a:pPr lvl="1"/>
-            <a:r>
-              <a:rPr lang="en-US" dirty="0"/>
-              <a:t>10/07/2020  Notify CVE </a:t>
-            </a:r>
-            <a:r>
-              <a:rPr lang="en-US" dirty="0" err="1"/>
-              <a:t>Mitre</a:t>
-            </a:r>
-            <a:r>
-              <a:rPr lang="en-US" dirty="0"/>
-              <a:t> to publish the CVE-2020-11749 </a:t>
-            </a:r>
-          </a:p>
-          <a:p>
-            <a:pPr lvl="1"/>
-            <a:r>
-              <a:rPr lang="en-US" dirty="0"/>
-              <a:t>14/07/2020 Published </a:t>
-            </a:r>
-          </a:p>
-          <a:p>
-            <a:pPr lvl="1"/>
             <a:endParaRPr lang="en-US" dirty="0"/>
           </a:p>
         </p:txBody>
@@ -6759,7 +7310,7 @@
     </p:spTree>
     <p:extLst>
       <p:ext uri="{BB962C8B-B14F-4D97-AF65-F5344CB8AC3E}">
-        <p14:creationId xmlns:p14="http://schemas.microsoft.com/office/powerpoint/2010/main" val="3129157716"/>
+        <p14:creationId xmlns:p14="http://schemas.microsoft.com/office/powerpoint/2010/main" val="3066563092"/>
       </p:ext>
     </p:extLst>
   </p:cSld>
@@ -6791,6 +7342,815 @@
           <p:cNvPr id="2" name="Title 1">
             <a:extLst>
               <a:ext uri="{FF2B5EF4-FFF2-40B4-BE49-F238E27FC236}">
+                <a16:creationId xmlns:a16="http://schemas.microsoft.com/office/drawing/2014/main" id="{07E48E60-C237-4A81-8A9C-82EA6859FB54}"/>
+              </a:ext>
+            </a:extLst>
+          </p:cNvPr>
+          <p:cNvSpPr>
+            <a:spLocks noGrp="1"/>
+          </p:cNvSpPr>
+          <p:nvPr>
+            <p:ph type="title"/>
+          </p:nvPr>
+        </p:nvSpPr>
+        <p:spPr>
+          <a:xfrm>
+            <a:off x="1295402" y="982132"/>
+            <a:ext cx="9601196" cy="1303867"/>
+          </a:xfrm>
+        </p:spPr>
+        <p:txBody>
+          <a:bodyPr>
+            <a:normAutofit/>
+          </a:bodyPr>
+          <a:lstStyle/>
+          <a:p>
+            <a:r>
+              <a:rPr lang="en-US" dirty="0"/>
+              <a:t>Demo CVE-2020-11749</a:t>
+            </a:r>
+          </a:p>
+        </p:txBody>
+      </p:sp>
+      <p:sp>
+        <p:nvSpPr>
+          <p:cNvPr id="3" name="Content Placeholder 2">
+            <a:extLst>
+              <a:ext uri="{FF2B5EF4-FFF2-40B4-BE49-F238E27FC236}">
+                <a16:creationId xmlns:a16="http://schemas.microsoft.com/office/drawing/2014/main" id="{6880B6D7-3236-45D4-B256-AC73C5D33F5D}"/>
+              </a:ext>
+            </a:extLst>
+          </p:cNvPr>
+          <p:cNvSpPr>
+            <a:spLocks noGrp="1"/>
+          </p:cNvSpPr>
+          <p:nvPr>
+            <p:ph idx="1"/>
+          </p:nvPr>
+        </p:nvSpPr>
+        <p:spPr/>
+        <p:txBody>
+          <a:bodyPr>
+            <a:normAutofit fontScale="85000" lnSpcReduction="20000"/>
+          </a:bodyPr>
+          <a:lstStyle/>
+          <a:p>
+            <a:r>
+              <a:rPr lang="en-US" dirty="0"/>
+              <a:t>Timeline</a:t>
+            </a:r>
+          </a:p>
+          <a:p>
+            <a:pPr lvl="1"/>
+            <a:r>
+              <a:rPr lang="en-US" dirty="0"/>
+              <a:t>14/04/2020 Request CVE </a:t>
+            </a:r>
+            <a:r>
+              <a:rPr lang="en-US" dirty="0" err="1"/>
+              <a:t>Mitre</a:t>
+            </a:r>
+            <a:endParaRPr lang="en-US" dirty="0"/>
+          </a:p>
+          <a:p>
+            <a:pPr lvl="1"/>
+            <a:r>
+              <a:rPr lang="en-US" dirty="0"/>
+              <a:t>15/04/2020 CVE-ID Assigned with *Disputed*, vendor doesn’t agree</a:t>
+            </a:r>
+          </a:p>
+          <a:p>
+            <a:pPr lvl="1"/>
+            <a:r>
+              <a:rPr lang="en-US" dirty="0"/>
+              <a:t>15/04/2020 Email vendors no reply</a:t>
+            </a:r>
+          </a:p>
+          <a:p>
+            <a:pPr lvl="1"/>
+            <a:r>
+              <a:rPr lang="en-US" dirty="0"/>
+              <a:t> 4/06/2020   Disclose on Twitter and </a:t>
+            </a:r>
+            <a:r>
+              <a:rPr lang="en-US" dirty="0" err="1"/>
+              <a:t>Linkedin</a:t>
+            </a:r>
+            <a:endParaRPr lang="en-US" dirty="0"/>
+          </a:p>
+          <a:p>
+            <a:pPr lvl="1"/>
+            <a:r>
+              <a:rPr lang="en-US" dirty="0"/>
+              <a:t> 5/06/2020  </a:t>
+            </a:r>
+            <a:r>
+              <a:rPr lang="en-US" dirty="0" err="1"/>
+              <a:t>PandoraFMS</a:t>
+            </a:r>
+            <a:r>
+              <a:rPr lang="en-US" dirty="0"/>
+              <a:t> replied</a:t>
+            </a:r>
+          </a:p>
+          <a:p>
+            <a:pPr lvl="1"/>
+            <a:r>
+              <a:rPr lang="en-US" dirty="0"/>
+              <a:t> 9/07/2020   Patch release with release notes </a:t>
+            </a:r>
+          </a:p>
+          <a:p>
+            <a:pPr lvl="1"/>
+            <a:r>
+              <a:rPr lang="en-US" dirty="0"/>
+              <a:t>10/07/2020  Notify CVE </a:t>
+            </a:r>
+            <a:r>
+              <a:rPr lang="en-US" dirty="0" err="1"/>
+              <a:t>Mitre</a:t>
+            </a:r>
+            <a:r>
+              <a:rPr lang="en-US" dirty="0"/>
+              <a:t> to publish the CVE-2020-11749 </a:t>
+            </a:r>
+          </a:p>
+          <a:p>
+            <a:pPr lvl="1"/>
+            <a:r>
+              <a:rPr lang="en-US" dirty="0"/>
+              <a:t>14/07/2020 Published </a:t>
+            </a:r>
+          </a:p>
+          <a:p>
+            <a:pPr lvl="1"/>
+            <a:endParaRPr lang="en-US" dirty="0"/>
+          </a:p>
+        </p:txBody>
+      </p:sp>
+    </p:spTree>
+    <p:extLst>
+      <p:ext uri="{BB962C8B-B14F-4D97-AF65-F5344CB8AC3E}">
+        <p14:creationId xmlns:p14="http://schemas.microsoft.com/office/powerpoint/2010/main" val="3129157716"/>
+      </p:ext>
+    </p:extLst>
+  </p:cSld>
+  <p:clrMapOvr>
+    <a:masterClrMapping/>
+  </p:clrMapOvr>
+</p:sld>
+</file>
+
+<file path=ppt/slides/slide16.xml><?xml version="1.0" encoding="utf-8"?>
+<p:sld xmlns:a="http://schemas.openxmlformats.org/drawingml/2006/main" xmlns:r="http://schemas.openxmlformats.org/officeDocument/2006/relationships" xmlns:p="http://schemas.openxmlformats.org/presentationml/2006/main">
+  <p:cSld>
+    <p:spTree>
+      <p:nvGrpSpPr>
+        <p:cNvPr id="1" name=""/>
+        <p:cNvGrpSpPr/>
+        <p:nvPr/>
+      </p:nvGrpSpPr>
+      <p:grpSpPr>
+        <a:xfrm>
+          <a:off x="0" y="0"/>
+          <a:ext cx="0" cy="0"/>
+          <a:chOff x="0" y="0"/>
+          <a:chExt cx="0" cy="0"/>
+        </a:xfrm>
+      </p:grpSpPr>
+      <p:sp>
+        <p:nvSpPr>
+          <p:cNvPr id="2" name="Title 1">
+            <a:extLst>
+              <a:ext uri="{FF2B5EF4-FFF2-40B4-BE49-F238E27FC236}">
+                <a16:creationId xmlns:a16="http://schemas.microsoft.com/office/drawing/2014/main" id="{F0A2A98C-D86B-4B89-B1B1-E11634827150}"/>
+              </a:ext>
+            </a:extLst>
+          </p:cNvPr>
+          <p:cNvSpPr>
+            <a:spLocks noGrp="1"/>
+          </p:cNvSpPr>
+          <p:nvPr>
+            <p:ph type="title"/>
+          </p:nvPr>
+        </p:nvSpPr>
+        <p:spPr>
+          <a:xfrm>
+            <a:off x="1004888" y="757029"/>
+            <a:ext cx="9601196" cy="1303867"/>
+          </a:xfrm>
+        </p:spPr>
+        <p:txBody>
+          <a:bodyPr>
+            <a:normAutofit fontScale="90000"/>
+          </a:bodyPr>
+          <a:lstStyle/>
+          <a:p>
+            <a:r>
+              <a:rPr lang="en-US" dirty="0"/>
+              <a:t>UPDATED ON 8/10/2020 00:05 AM</a:t>
+            </a:r>
+            <a:br>
+              <a:rPr lang="en-US" dirty="0"/>
+            </a:br>
+            <a:r>
+              <a:rPr lang="en-US" dirty="0"/>
+              <a:t>ONLY FOR NUS </a:t>
+            </a:r>
+          </a:p>
+        </p:txBody>
+      </p:sp>
+      <p:sp>
+        <p:nvSpPr>
+          <p:cNvPr id="3" name="Content Placeholder 2">
+            <a:extLst>
+              <a:ext uri="{FF2B5EF4-FFF2-40B4-BE49-F238E27FC236}">
+                <a16:creationId xmlns:a16="http://schemas.microsoft.com/office/drawing/2014/main" id="{44F3A6B9-145C-49CE-BE48-A1D1803E6C6D}"/>
+              </a:ext>
+            </a:extLst>
+          </p:cNvPr>
+          <p:cNvSpPr>
+            <a:spLocks noGrp="1"/>
+          </p:cNvSpPr>
+          <p:nvPr>
+            <p:ph idx="1"/>
+          </p:nvPr>
+        </p:nvSpPr>
+        <p:spPr>
+          <a:xfrm>
+            <a:off x="1295401" y="2461682"/>
+            <a:ext cx="9601196" cy="3318936"/>
+          </a:xfrm>
+        </p:spPr>
+        <p:txBody>
+          <a:bodyPr/>
+          <a:lstStyle/>
+          <a:p>
+            <a:r>
+              <a:rPr lang="en-US" dirty="0"/>
+              <a:t>Proof of Concept is not disclose </a:t>
+            </a:r>
+          </a:p>
+        </p:txBody>
+      </p:sp>
+      <p:pic>
+        <p:nvPicPr>
+          <p:cNvPr id="9" name="Picture 8">
+            <a:extLst>
+              <a:ext uri="{FF2B5EF4-FFF2-40B4-BE49-F238E27FC236}">
+                <a16:creationId xmlns:a16="http://schemas.microsoft.com/office/drawing/2014/main" id="{05584F4D-3049-4633-A075-A42E7FC5E575}"/>
+              </a:ext>
+            </a:extLst>
+          </p:cNvPr>
+          <p:cNvPicPr>
+            <a:picLocks noChangeAspect="1"/>
+          </p:cNvPicPr>
+          <p:nvPr/>
+        </p:nvPicPr>
+        <p:blipFill rotWithShape="1">
+          <a:blip r:embed="rId3"/>
+          <a:srcRect l="1329" t="3838" r="10625" b="26945"/>
+          <a:stretch/>
+        </p:blipFill>
+        <p:spPr>
+          <a:xfrm>
+            <a:off x="647700" y="3019425"/>
+            <a:ext cx="10734672" cy="3144548"/>
+          </a:xfrm>
+          <a:prstGeom prst="rect">
+            <a:avLst/>
+          </a:prstGeom>
+        </p:spPr>
+      </p:pic>
+      <p:pic>
+        <p:nvPicPr>
+          <p:cNvPr id="5" name="Picture 4">
+            <a:extLst>
+              <a:ext uri="{FF2B5EF4-FFF2-40B4-BE49-F238E27FC236}">
+                <a16:creationId xmlns:a16="http://schemas.microsoft.com/office/drawing/2014/main" id="{9083CBE4-0163-40D9-8DA5-329FD130EDEB}"/>
+              </a:ext>
+            </a:extLst>
+          </p:cNvPr>
+          <p:cNvPicPr>
+            <a:picLocks noChangeAspect="1"/>
+          </p:cNvPicPr>
+          <p:nvPr/>
+        </p:nvPicPr>
+        <p:blipFill>
+          <a:blip r:embed="rId4"/>
+          <a:stretch>
+            <a:fillRect/>
+          </a:stretch>
+        </p:blipFill>
+        <p:spPr>
+          <a:xfrm>
+            <a:off x="4243387" y="2845037"/>
+            <a:ext cx="7215185" cy="3354330"/>
+          </a:xfrm>
+          <a:prstGeom prst="rect">
+            <a:avLst/>
+          </a:prstGeom>
+        </p:spPr>
+      </p:pic>
+    </p:spTree>
+    <p:extLst>
+      <p:ext uri="{BB962C8B-B14F-4D97-AF65-F5344CB8AC3E}">
+        <p14:creationId xmlns:p14="http://schemas.microsoft.com/office/powerpoint/2010/main" val="1431404633"/>
+      </p:ext>
+    </p:extLst>
+  </p:cSld>
+  <p:clrMapOvr>
+    <a:masterClrMapping/>
+  </p:clrMapOvr>
+  <p:timing>
+    <p:tnLst>
+      <p:par>
+        <p:cTn id="1" dur="indefinite" restart="never" nodeType="tmRoot">
+          <p:childTnLst>
+            <p:seq concurrent="1" nextAc="seek">
+              <p:cTn id="2" dur="indefinite" nodeType="mainSeq">
+                <p:childTnLst>
+                  <p:par>
+                    <p:cTn id="3" fill="hold">
+                      <p:stCondLst>
+                        <p:cond delay="indefinite"/>
+                      </p:stCondLst>
+                      <p:childTnLst>
+                        <p:par>
+                          <p:cTn id="4" fill="hold">
+                            <p:stCondLst>
+                              <p:cond delay="0"/>
+                            </p:stCondLst>
+                            <p:childTnLst>
+                              <p:par>
+                                <p:cTn id="5" presetID="42" presetClass="entr" presetSubtype="0" fill="hold" nodeType="clickEffect">
+                                  <p:stCondLst>
+                                    <p:cond delay="0"/>
+                                  </p:stCondLst>
+                                  <p:childTnLst>
+                                    <p:set>
+                                      <p:cBhvr>
+                                        <p:cTn id="6" dur="1" fill="hold">
+                                          <p:stCondLst>
+                                            <p:cond delay="0"/>
+                                          </p:stCondLst>
+                                        </p:cTn>
+                                        <p:tgtEl>
+                                          <p:spTgt spid="5"/>
+                                        </p:tgtEl>
+                                        <p:attrNameLst>
+                                          <p:attrName>style.visibility</p:attrName>
+                                        </p:attrNameLst>
+                                      </p:cBhvr>
+                                      <p:to>
+                                        <p:strVal val="visible"/>
+                                      </p:to>
+                                    </p:set>
+                                    <p:animEffect transition="in" filter="fade">
+                                      <p:cBhvr>
+                                        <p:cTn id="7" dur="1000"/>
+                                        <p:tgtEl>
+                                          <p:spTgt spid="5"/>
+                                        </p:tgtEl>
+                                      </p:cBhvr>
+                                    </p:animEffect>
+                                    <p:anim calcmode="lin" valueType="num">
+                                      <p:cBhvr>
+                                        <p:cTn id="8" dur="1000" fill="hold"/>
+                                        <p:tgtEl>
+                                          <p:spTgt spid="5"/>
+                                        </p:tgtEl>
+                                        <p:attrNameLst>
+                                          <p:attrName>ppt_x</p:attrName>
+                                        </p:attrNameLst>
+                                      </p:cBhvr>
+                                      <p:tavLst>
+                                        <p:tav tm="0">
+                                          <p:val>
+                                            <p:strVal val="#ppt_x"/>
+                                          </p:val>
+                                        </p:tav>
+                                        <p:tav tm="100000">
+                                          <p:val>
+                                            <p:strVal val="#ppt_x"/>
+                                          </p:val>
+                                        </p:tav>
+                                      </p:tavLst>
+                                    </p:anim>
+                                    <p:anim calcmode="lin" valueType="num">
+                                      <p:cBhvr>
+                                        <p:cTn id="9" dur="1000" fill="hold"/>
+                                        <p:tgtEl>
+                                          <p:spTgt spid="5"/>
+                                        </p:tgtEl>
+                                        <p:attrNameLst>
+                                          <p:attrName>ppt_y</p:attrName>
+                                        </p:attrNameLst>
+                                      </p:cBhvr>
+                                      <p:tavLst>
+                                        <p:tav tm="0">
+                                          <p:val>
+                                            <p:strVal val="#ppt_y+.1"/>
+                                          </p:val>
+                                        </p:tav>
+                                        <p:tav tm="100000">
+                                          <p:val>
+                                            <p:strVal val="#ppt_y"/>
+                                          </p:val>
+                                        </p:tav>
+                                      </p:tavLst>
+                                    </p:anim>
+                                  </p:childTnLst>
+                                </p:cTn>
+                              </p:par>
+                            </p:childTnLst>
+                          </p:cTn>
+                        </p:par>
+                      </p:childTnLst>
+                    </p:cTn>
+                  </p:par>
+                </p:childTnLst>
+              </p:cTn>
+              <p:prevCondLst>
+                <p:cond evt="onPrev" delay="0">
+                  <p:tgtEl>
+                    <p:sldTgt/>
+                  </p:tgtEl>
+                </p:cond>
+              </p:prevCondLst>
+              <p:nextCondLst>
+                <p:cond evt="onNext" delay="0">
+                  <p:tgtEl>
+                    <p:sldTgt/>
+                  </p:tgtEl>
+                </p:cond>
+              </p:nextCondLst>
+            </p:seq>
+          </p:childTnLst>
+        </p:cTn>
+      </p:par>
+    </p:tnLst>
+  </p:timing>
+</p:sld>
+</file>
+
+<file path=ppt/slides/slide17.xml><?xml version="1.0" encoding="utf-8"?>
+<p:sld xmlns:a="http://schemas.openxmlformats.org/drawingml/2006/main" xmlns:r="http://schemas.openxmlformats.org/officeDocument/2006/relationships" xmlns:p="http://schemas.openxmlformats.org/presentationml/2006/main">
+  <p:cSld>
+    <p:spTree>
+      <p:nvGrpSpPr>
+        <p:cNvPr id="1" name=""/>
+        <p:cNvGrpSpPr/>
+        <p:nvPr/>
+      </p:nvGrpSpPr>
+      <p:grpSpPr>
+        <a:xfrm>
+          <a:off x="0" y="0"/>
+          <a:ext cx="0" cy="0"/>
+          <a:chOff x="0" y="0"/>
+          <a:chExt cx="0" cy="0"/>
+        </a:xfrm>
+      </p:grpSpPr>
+      <p:sp>
+        <p:nvSpPr>
+          <p:cNvPr id="2" name="Title 1">
+            <a:extLst>
+              <a:ext uri="{FF2B5EF4-FFF2-40B4-BE49-F238E27FC236}">
+                <a16:creationId xmlns:a16="http://schemas.microsoft.com/office/drawing/2014/main" id="{09EDDD1A-8BA1-4009-8234-69AA2171893D}"/>
+              </a:ext>
+            </a:extLst>
+          </p:cNvPr>
+          <p:cNvSpPr>
+            <a:spLocks noGrp="1"/>
+          </p:cNvSpPr>
+          <p:nvPr>
+            <p:ph type="title"/>
+          </p:nvPr>
+        </p:nvSpPr>
+        <p:spPr/>
+        <p:txBody>
+          <a:bodyPr/>
+          <a:lstStyle/>
+          <a:p>
+            <a:r>
+              <a:rPr lang="en-US" dirty="0"/>
+              <a:t>CVE-2020-25735</a:t>
+            </a:r>
+          </a:p>
+        </p:txBody>
+      </p:sp>
+      <p:sp>
+        <p:nvSpPr>
+          <p:cNvPr id="3" name="Content Placeholder 2">
+            <a:extLst>
+              <a:ext uri="{FF2B5EF4-FFF2-40B4-BE49-F238E27FC236}">
+                <a16:creationId xmlns:a16="http://schemas.microsoft.com/office/drawing/2014/main" id="{D848BB04-CB75-4AA7-9D11-8EAEFA532813}"/>
+              </a:ext>
+            </a:extLst>
+          </p:cNvPr>
+          <p:cNvSpPr>
+            <a:spLocks noGrp="1"/>
+          </p:cNvSpPr>
+          <p:nvPr>
+            <p:ph idx="1"/>
+          </p:nvPr>
+        </p:nvSpPr>
+        <p:spPr/>
+        <p:txBody>
+          <a:bodyPr/>
+          <a:lstStyle/>
+          <a:p>
+            <a:r>
+              <a:rPr lang="en-US" dirty="0"/>
+              <a:t>Vendor :</a:t>
+            </a:r>
+            <a:r>
+              <a:rPr lang="en-US" dirty="0" err="1"/>
+              <a:t>WebTareas</a:t>
+            </a:r>
+            <a:r>
+              <a:rPr lang="en-US" dirty="0"/>
+              <a:t> </a:t>
+            </a:r>
+          </a:p>
+          <a:p>
+            <a:r>
+              <a:rPr lang="en-US" dirty="0"/>
+              <a:t>Vulnerable : XSS Stored Cross Site Scripting </a:t>
+            </a:r>
+          </a:p>
+          <a:p>
+            <a:r>
+              <a:rPr lang="en-US" dirty="0"/>
+              <a:t>Product : </a:t>
+            </a:r>
+            <a:r>
+              <a:rPr lang="en-US" dirty="0" err="1"/>
+              <a:t>WebTareas</a:t>
+            </a:r>
+            <a:r>
+              <a:rPr lang="en-US" dirty="0"/>
+              <a:t> &lt;= 2.1p</a:t>
+            </a:r>
+            <a:endParaRPr lang="en-US" b="1" dirty="0"/>
+          </a:p>
+          <a:p>
+            <a:r>
+              <a:rPr lang="pt-BR" b="1" dirty="0"/>
+              <a:t>CVSS:3.1/AV:N/AC:L/PR:N/UI:R/S:C/C:L/I:L/A:N</a:t>
+            </a:r>
+          </a:p>
+          <a:p>
+            <a:r>
+              <a:rPr lang="pt-BR" b="1" dirty="0"/>
+              <a:t>CVSS:2.0/AV:N/AC:M/Au:N/C:N/I:P/A:N</a:t>
+            </a:r>
+          </a:p>
+          <a:p>
+            <a:r>
+              <a:rPr lang="pt-BR" dirty="0"/>
+              <a:t>*SourceForge* </a:t>
+            </a:r>
+            <a:endParaRPr lang="en-US" dirty="0"/>
+          </a:p>
+          <a:p>
+            <a:endParaRPr lang="en-US" dirty="0"/>
+          </a:p>
+          <a:p>
+            <a:endParaRPr lang="en-US" dirty="0"/>
+          </a:p>
+        </p:txBody>
+      </p:sp>
+      <p:pic>
+        <p:nvPicPr>
+          <p:cNvPr id="5" name="Picture 4">
+            <a:extLst>
+              <a:ext uri="{FF2B5EF4-FFF2-40B4-BE49-F238E27FC236}">
+                <a16:creationId xmlns:a16="http://schemas.microsoft.com/office/drawing/2014/main" id="{A2D0F384-FAB6-48F2-9853-DA882A0E58A1}"/>
+              </a:ext>
+            </a:extLst>
+          </p:cNvPr>
+          <p:cNvPicPr>
+            <a:picLocks noChangeAspect="1"/>
+          </p:cNvPicPr>
+          <p:nvPr/>
+        </p:nvPicPr>
+        <p:blipFill rotWithShape="1">
+          <a:blip r:embed="rId2"/>
+          <a:srcRect r="3516"/>
+          <a:stretch/>
+        </p:blipFill>
+        <p:spPr>
+          <a:xfrm>
+            <a:off x="214311" y="1969903"/>
+            <a:ext cx="11763375" cy="2918193"/>
+          </a:xfrm>
+          <a:prstGeom prst="rect">
+            <a:avLst/>
+          </a:prstGeom>
+        </p:spPr>
+      </p:pic>
+      <p:pic>
+        <p:nvPicPr>
+          <p:cNvPr id="7" name="Picture 6">
+            <a:extLst>
+              <a:ext uri="{FF2B5EF4-FFF2-40B4-BE49-F238E27FC236}">
+                <a16:creationId xmlns:a16="http://schemas.microsoft.com/office/drawing/2014/main" id="{537117FD-D77D-41D2-AC43-85720D09CEDF}"/>
+              </a:ext>
+            </a:extLst>
+          </p:cNvPr>
+          <p:cNvPicPr>
+            <a:picLocks noChangeAspect="1"/>
+          </p:cNvPicPr>
+          <p:nvPr/>
+        </p:nvPicPr>
+        <p:blipFill>
+          <a:blip r:embed="rId3"/>
+          <a:stretch>
+            <a:fillRect/>
+          </a:stretch>
+        </p:blipFill>
+        <p:spPr>
+          <a:xfrm>
+            <a:off x="2365957" y="1805515"/>
+            <a:ext cx="7460082" cy="3429000"/>
+          </a:xfrm>
+          <a:prstGeom prst="rect">
+            <a:avLst/>
+          </a:prstGeom>
+        </p:spPr>
+      </p:pic>
+    </p:spTree>
+    <p:extLst>
+      <p:ext uri="{BB962C8B-B14F-4D97-AF65-F5344CB8AC3E}">
+        <p14:creationId xmlns:p14="http://schemas.microsoft.com/office/powerpoint/2010/main" val="1098446423"/>
+      </p:ext>
+    </p:extLst>
+  </p:cSld>
+  <p:clrMapOvr>
+    <a:masterClrMapping/>
+  </p:clrMapOvr>
+  <p:timing>
+    <p:tnLst>
+      <p:par>
+        <p:cTn id="1" dur="indefinite" restart="never" nodeType="tmRoot">
+          <p:childTnLst>
+            <p:seq concurrent="1" nextAc="seek">
+              <p:cTn id="2" dur="indefinite" nodeType="mainSeq">
+                <p:childTnLst>
+                  <p:par>
+                    <p:cTn id="3" fill="hold">
+                      <p:stCondLst>
+                        <p:cond delay="indefinite"/>
+                      </p:stCondLst>
+                      <p:childTnLst>
+                        <p:par>
+                          <p:cTn id="4" fill="hold">
+                            <p:stCondLst>
+                              <p:cond delay="0"/>
+                            </p:stCondLst>
+                            <p:childTnLst>
+                              <p:par>
+                                <p:cTn id="5" presetID="16" presetClass="entr" presetSubtype="21" fill="hold" nodeType="clickEffect">
+                                  <p:stCondLst>
+                                    <p:cond delay="0"/>
+                                  </p:stCondLst>
+                                  <p:childTnLst>
+                                    <p:set>
+                                      <p:cBhvr>
+                                        <p:cTn id="6" dur="1" fill="hold">
+                                          <p:stCondLst>
+                                            <p:cond delay="0"/>
+                                          </p:stCondLst>
+                                        </p:cTn>
+                                        <p:tgtEl>
+                                          <p:spTgt spid="5"/>
+                                        </p:tgtEl>
+                                        <p:attrNameLst>
+                                          <p:attrName>style.visibility</p:attrName>
+                                        </p:attrNameLst>
+                                      </p:cBhvr>
+                                      <p:to>
+                                        <p:strVal val="visible"/>
+                                      </p:to>
+                                    </p:set>
+                                    <p:animEffect transition="in" filter="barn(inVertical)">
+                                      <p:cBhvr>
+                                        <p:cTn id="7" dur="500"/>
+                                        <p:tgtEl>
+                                          <p:spTgt spid="5"/>
+                                        </p:tgtEl>
+                                      </p:cBhvr>
+                                    </p:animEffect>
+                                  </p:childTnLst>
+                                </p:cTn>
+                              </p:par>
+                            </p:childTnLst>
+                          </p:cTn>
+                        </p:par>
+                      </p:childTnLst>
+                    </p:cTn>
+                  </p:par>
+                  <p:par>
+                    <p:cTn id="8" fill="hold">
+                      <p:stCondLst>
+                        <p:cond delay="indefinite"/>
+                      </p:stCondLst>
+                      <p:childTnLst>
+                        <p:par>
+                          <p:cTn id="9" fill="hold">
+                            <p:stCondLst>
+                              <p:cond delay="0"/>
+                            </p:stCondLst>
+                            <p:childTnLst>
+                              <p:par>
+                                <p:cTn id="10" presetID="22" presetClass="entr" presetSubtype="4" fill="hold" nodeType="clickEffect">
+                                  <p:stCondLst>
+                                    <p:cond delay="0"/>
+                                  </p:stCondLst>
+                                  <p:childTnLst>
+                                    <p:set>
+                                      <p:cBhvr>
+                                        <p:cTn id="11" dur="1" fill="hold">
+                                          <p:stCondLst>
+                                            <p:cond delay="0"/>
+                                          </p:stCondLst>
+                                        </p:cTn>
+                                        <p:tgtEl>
+                                          <p:spTgt spid="7"/>
+                                        </p:tgtEl>
+                                        <p:attrNameLst>
+                                          <p:attrName>style.visibility</p:attrName>
+                                        </p:attrNameLst>
+                                      </p:cBhvr>
+                                      <p:to>
+                                        <p:strVal val="visible"/>
+                                      </p:to>
+                                    </p:set>
+                                    <p:animEffect transition="in" filter="wipe(down)">
+                                      <p:cBhvr>
+                                        <p:cTn id="12" dur="500"/>
+                                        <p:tgtEl>
+                                          <p:spTgt spid="7"/>
+                                        </p:tgtEl>
+                                      </p:cBhvr>
+                                    </p:animEffect>
+                                  </p:childTnLst>
+                                </p:cTn>
+                              </p:par>
+                            </p:childTnLst>
+                          </p:cTn>
+                        </p:par>
+                      </p:childTnLst>
+                    </p:cTn>
+                  </p:par>
+                </p:childTnLst>
+              </p:cTn>
+              <p:prevCondLst>
+                <p:cond evt="onPrev" delay="0">
+                  <p:tgtEl>
+                    <p:sldTgt/>
+                  </p:tgtEl>
+                </p:cond>
+              </p:prevCondLst>
+              <p:nextCondLst>
+                <p:cond evt="onNext" delay="0">
+                  <p:tgtEl>
+                    <p:sldTgt/>
+                  </p:tgtEl>
+                </p:cond>
+              </p:nextCondLst>
+            </p:seq>
+          </p:childTnLst>
+        </p:cTn>
+      </p:par>
+    </p:tnLst>
+  </p:timing>
+</p:sld>
+</file>
+
+<file path=ppt/slides/slide18.xml><?xml version="1.0" encoding="utf-8"?>
+<p:sld xmlns:a="http://schemas.openxmlformats.org/drawingml/2006/main" xmlns:r="http://schemas.openxmlformats.org/officeDocument/2006/relationships" xmlns:p="http://schemas.openxmlformats.org/presentationml/2006/main">
+  <p:cSld>
+    <p:spTree>
+      <p:nvGrpSpPr>
+        <p:cNvPr id="1" name=""/>
+        <p:cNvGrpSpPr/>
+        <p:nvPr/>
+      </p:nvGrpSpPr>
+      <p:grpSpPr>
+        <a:xfrm>
+          <a:off x="0" y="0"/>
+          <a:ext cx="0" cy="0"/>
+          <a:chOff x="0" y="0"/>
+          <a:chExt cx="0" cy="0"/>
+        </a:xfrm>
+      </p:grpSpPr>
+      <p:sp>
+        <p:nvSpPr>
+          <p:cNvPr id="2" name="Title 1">
+            <a:extLst>
+              <a:ext uri="{FF2B5EF4-FFF2-40B4-BE49-F238E27FC236}">
                 <a16:creationId xmlns:a16="http://schemas.microsoft.com/office/drawing/2014/main" id="{1F8BC447-F45B-4E3B-8EDA-1BEA69947D59}"/>
               </a:ext>
             </a:extLst>
@@ -6873,15 +8233,16 @@
           </a:p>
           <a:p>
             <a:r>
-              <a:rPr lang="en-US" b="1" dirty="0"/>
-              <a:t>CVSS 3.1 Unknown</a:t>
-            </a:r>
-          </a:p>
-          <a:p>
-            <a:r>
-              <a:rPr lang="en-US" b="1" dirty="0"/>
-              <a:t>CVSS 2.0 Unknown </a:t>
-            </a:r>
+              <a:rPr lang="pt-BR" b="1" dirty="0"/>
+              <a:t>CVSS:3.1/AV:N/AC:L/PR:N/UI:N/S:U/C:N/I:H/A:N</a:t>
+            </a:r>
+          </a:p>
+          <a:p>
+            <a:r>
+              <a:rPr lang="pt-BR" b="1" dirty="0"/>
+              <a:t>CVSS:2.0/AV:N/AC:L/Au:N/C:N/I:P/A:N</a:t>
+            </a:r>
+            <a:endParaRPr lang="en-US" b="1" dirty="0"/>
           </a:p>
           <a:p>
             <a:r>
@@ -6917,7 +8278,7 @@
         </p:blipFill>
         <p:spPr>
           <a:xfrm>
-            <a:off x="256874" y="1760857"/>
+            <a:off x="256874" y="1323408"/>
             <a:ext cx="11678250" cy="4115011"/>
           </a:xfrm>
           <a:prstGeom prst="rect">
@@ -6927,10 +8288,10 @@
       </p:pic>
       <p:pic>
         <p:nvPicPr>
-          <p:cNvPr id="5" name="Picture 4">
+          <p:cNvPr id="7" name="Picture 6">
             <a:extLst>
               <a:ext uri="{FF2B5EF4-FFF2-40B4-BE49-F238E27FC236}">
-                <a16:creationId xmlns:a16="http://schemas.microsoft.com/office/drawing/2014/main" id="{391E520C-FB43-4000-90D3-8ED9E9BB7BB2}"/>
+                <a16:creationId xmlns:a16="http://schemas.microsoft.com/office/drawing/2014/main" id="{AFA24190-0FB8-4CCB-A658-75C2C5450F82}"/>
               </a:ext>
             </a:extLst>
           </p:cNvPr>
@@ -6947,8 +8308,8 @@
         </p:blipFill>
         <p:spPr>
           <a:xfrm>
-            <a:off x="57149" y="1313393"/>
-            <a:ext cx="12077700" cy="4562475"/>
+            <a:off x="1489892" y="1697292"/>
+            <a:ext cx="9067800" cy="3367242"/>
           </a:xfrm>
           <a:prstGeom prst="rect">
             <a:avLst/>
@@ -7051,7 +8412,7 @@
                             </p:stCondLst>
                             <p:childTnLst>
                               <p:par>
-                                <p:cTn id="10" presetID="14" presetClass="entr" presetSubtype="10" fill="hold" nodeType="clickEffect">
+                                <p:cTn id="10" presetID="2" presetClass="entr" presetSubtype="4" fill="hold" nodeType="clickEffect">
                                   <p:stCondLst>
                                     <p:cond delay="0"/>
                                   </p:stCondLst>
@@ -7064,7 +8425,7 @@
                                           </p:stCondLst>
                                         </p:cTn>
                                         <p:tgtEl>
-                                          <p:spTgt spid="5"/>
+                                          <p:spTgt spid="7"/>
                                         </p:tgtEl>
                                         <p:attrNameLst>
                                           <p:attrName>style.visibility</p:attrName>
@@ -7074,14 +8435,52 @@
                                         <p:strVal val="visible"/>
                                       </p:to>
                                     </p:set>
-                                    <p:animEffect transition="in" filter="randombar(horizontal)">
-                                      <p:cBhvr>
-                                        <p:cTn id="12" dur="500"/>
+                                    <p:anim calcmode="lin" valueType="num">
+                                      <p:cBhvr additive="base">
+                                        <p:cTn id="12" dur="500" fill="hold"/>
                                         <p:tgtEl>
-                                          <p:spTgt spid="5"/>
+                                          <p:spTgt spid="7"/>
                                         </p:tgtEl>
+                                        <p:attrNameLst>
+                                          <p:attrName>ppt_x</p:attrName>
+                                        </p:attrNameLst>
                                       </p:cBhvr>
-                                    </p:animEffect>
+                                      <p:tavLst>
+                                        <p:tav tm="0">
+                                          <p:val>
+                                            <p:strVal val="#ppt_x"/>
+                                          </p:val>
+                                        </p:tav>
+                                        <p:tav tm="100000">
+                                          <p:val>
+                                            <p:strVal val="#ppt_x"/>
+                                          </p:val>
+                                        </p:tav>
+                                      </p:tavLst>
+                                    </p:anim>
+                                    <p:anim calcmode="lin" valueType="num">
+                                      <p:cBhvr additive="base">
+                                        <p:cTn id="13" dur="500" fill="hold"/>
+                                        <p:tgtEl>
+                                          <p:spTgt spid="7"/>
+                                        </p:tgtEl>
+                                        <p:attrNameLst>
+                                          <p:attrName>ppt_y</p:attrName>
+                                        </p:attrNameLst>
+                                      </p:cBhvr>
+                                      <p:tavLst>
+                                        <p:tav tm="0">
+                                          <p:val>
+                                            <p:strVal val="1+#ppt_h/2"/>
+                                          </p:val>
+                                        </p:tav>
+                                        <p:tav tm="100000">
+                                          <p:val>
+                                            <p:strVal val="#ppt_y"/>
+                                          </p:val>
+                                        </p:tav>
+                                      </p:tavLst>
+                                    </p:anim>
                                   </p:childTnLst>
                                 </p:cTn>
                               </p:par>
@@ -7116,7 +8515,7 @@
 </p:sld>
 </file>
 
-<file path=ppt/slides/slide16.xml><?xml version="1.0" encoding="utf-8"?>
+<file path=ppt/slides/slide19.xml><?xml version="1.0" encoding="utf-8"?>
 <p:sld xmlns:a="http://schemas.openxmlformats.org/drawingml/2006/main" xmlns:r="http://schemas.openxmlformats.org/officeDocument/2006/relationships" xmlns:p="http://schemas.openxmlformats.org/presentationml/2006/main">
   <p:cSld>
     <p:spTree>
@@ -7239,10 +8638,22 @@
             </a:r>
             <a:r>
               <a:rPr lang="en-US" dirty="0"/>
-              <a:t>”, “.</a:t>
-            </a:r>
-            <a:r>
-              <a:rPr lang="en-US" dirty="0" err="1"/>
+              <a:t>”, “</a:t>
+            </a:r>
+            <a:r>
+              <a:rPr lang="en-US" b="1" dirty="0">
+                <a:solidFill>
+                  <a:srgbClr val="FF0000"/>
+                </a:solidFill>
+              </a:rPr>
+              <a:t>.</a:t>
+            </a:r>
+            <a:r>
+              <a:rPr lang="en-US" b="1" dirty="0" err="1">
+                <a:solidFill>
+                  <a:srgbClr val="FF0000"/>
+                </a:solidFill>
+              </a:rPr>
               <a:t>shtml</a:t>
             </a:r>
             <a:r>
@@ -7318,7 +8729,149 @@
 </p:sld>
 </file>
 
-<file path=ppt/slides/slide17.xml><?xml version="1.0" encoding="utf-8"?>
+<file path=ppt/slides/slide2.xml><?xml version="1.0" encoding="utf-8"?>
+<p:sld xmlns:a="http://schemas.openxmlformats.org/drawingml/2006/main" xmlns:r="http://schemas.openxmlformats.org/officeDocument/2006/relationships" xmlns:p="http://schemas.openxmlformats.org/presentationml/2006/main">
+  <p:cSld>
+    <p:spTree>
+      <p:nvGrpSpPr>
+        <p:cNvPr id="1" name=""/>
+        <p:cNvGrpSpPr/>
+        <p:nvPr/>
+      </p:nvGrpSpPr>
+      <p:grpSpPr>
+        <a:xfrm>
+          <a:off x="0" y="0"/>
+          <a:ext cx="0" cy="0"/>
+          <a:chOff x="0" y="0"/>
+          <a:chExt cx="0" cy="0"/>
+        </a:xfrm>
+      </p:grpSpPr>
+      <p:sp>
+        <p:nvSpPr>
+          <p:cNvPr id="2" name="Title 1">
+            <a:extLst>
+              <a:ext uri="{FF2B5EF4-FFF2-40B4-BE49-F238E27FC236}">
+                <a16:creationId xmlns:a16="http://schemas.microsoft.com/office/drawing/2014/main" id="{4D2CC3D3-F985-4DBF-B42C-532EF5B7942E}"/>
+              </a:ext>
+            </a:extLst>
+          </p:cNvPr>
+          <p:cNvSpPr>
+            <a:spLocks noGrp="1"/>
+          </p:cNvSpPr>
+          <p:nvPr>
+            <p:ph type="title"/>
+          </p:nvPr>
+        </p:nvSpPr>
+        <p:spPr/>
+        <p:txBody>
+          <a:bodyPr/>
+          <a:lstStyle/>
+          <a:p>
+            <a:r>
+              <a:rPr lang="en-US" dirty="0"/>
+              <a:t>$</a:t>
+            </a:r>
+            <a:r>
+              <a:rPr lang="en-US" dirty="0" err="1"/>
+              <a:t>whoami</a:t>
+            </a:r>
+            <a:endParaRPr lang="en-US" dirty="0"/>
+          </a:p>
+        </p:txBody>
+      </p:sp>
+      <p:sp>
+        <p:nvSpPr>
+          <p:cNvPr id="3" name="Content Placeholder 2">
+            <a:extLst>
+              <a:ext uri="{FF2B5EF4-FFF2-40B4-BE49-F238E27FC236}">
+                <a16:creationId xmlns:a16="http://schemas.microsoft.com/office/drawing/2014/main" id="{846FE696-0F9D-42FC-8EBC-F513EFE611B3}"/>
+              </a:ext>
+            </a:extLst>
+          </p:cNvPr>
+          <p:cNvSpPr>
+            <a:spLocks noGrp="1"/>
+          </p:cNvSpPr>
+          <p:nvPr>
+            <p:ph idx="1"/>
+          </p:nvPr>
+        </p:nvSpPr>
+        <p:spPr>
+          <a:xfrm>
+            <a:off x="1295401" y="2556932"/>
+            <a:ext cx="9601196" cy="3318936"/>
+          </a:xfrm>
+        </p:spPr>
+        <p:txBody>
+          <a:bodyPr>
+            <a:normAutofit lnSpcReduction="10000"/>
+          </a:bodyPr>
+          <a:lstStyle/>
+          <a:p>
+            <a:r>
+              <a:rPr lang="en-US" dirty="0"/>
+              <a:t>TEH WIN SAM (</a:t>
+            </a:r>
+            <a:r>
+              <a:rPr lang="en-US" dirty="0" err="1"/>
+              <a:t>AppleBois</a:t>
+            </a:r>
+            <a:r>
+              <a:rPr lang="en-US" dirty="0"/>
+              <a:t>)</a:t>
+            </a:r>
+          </a:p>
+          <a:p>
+            <a:r>
+              <a:rPr lang="en-US" dirty="0"/>
+              <a:t>23 (1997)</a:t>
+            </a:r>
+          </a:p>
+          <a:p>
+            <a:r>
+              <a:rPr lang="en-US" dirty="0"/>
+              <a:t>CVE HUNTER</a:t>
+            </a:r>
+          </a:p>
+          <a:p>
+            <a:r>
+              <a:rPr lang="en-US" dirty="0"/>
+              <a:t>CREST CRT,OSWE,OSCE,OSCP,CHFI,CEH,CND,SLAE64 ...</a:t>
+            </a:r>
+          </a:p>
+          <a:p>
+            <a:r>
+              <a:rPr lang="en-US" dirty="0"/>
+              <a:t>Associate at Deloitte</a:t>
+            </a:r>
+          </a:p>
+          <a:p>
+            <a:r>
+              <a:rPr lang="en-US" dirty="0"/>
+              <a:t>Bachelors of Computer Science from UOW </a:t>
+            </a:r>
+          </a:p>
+          <a:p>
+            <a:r>
+              <a:rPr lang="en-US" dirty="0"/>
+              <a:t>Graduated on July 2020</a:t>
+            </a:r>
+          </a:p>
+        </p:txBody>
+      </p:sp>
+    </p:spTree>
+    <p:extLst>
+      <p:ext uri="{BB962C8B-B14F-4D97-AF65-F5344CB8AC3E}">
+        <p14:creationId xmlns:p14="http://schemas.microsoft.com/office/powerpoint/2010/main" val="3238377738"/>
+      </p:ext>
+    </p:extLst>
+  </p:cSld>
+  <p:clrMapOvr>
+    <a:masterClrMapping/>
+  </p:clrMapOvr>
+</p:sld>
+</file>
+
+<file path=ppt/slides/slide20.xml><?xml version="1.0" encoding="utf-8"?>
 <p:sld xmlns:a="http://schemas.openxmlformats.org/drawingml/2006/main" xmlns:r="http://schemas.openxmlformats.org/officeDocument/2006/relationships" xmlns:p="http://schemas.openxmlformats.org/presentationml/2006/main">
   <p:cSld>
     <p:spTree>
@@ -7903,7 +9456,7 @@
 </p:sld>
 </file>
 
-<file path=ppt/slides/slide18.xml><?xml version="1.0" encoding="utf-8"?>
+<file path=ppt/slides/slide21.xml><?xml version="1.0" encoding="utf-8"?>
 <p:sld xmlns:a="http://schemas.openxmlformats.org/drawingml/2006/main" xmlns:r="http://schemas.openxmlformats.org/officeDocument/2006/relationships" xmlns:p="http://schemas.openxmlformats.org/presentationml/2006/main">
   <p:cSld>
     <p:spTree>
@@ -8109,7 +9662,7 @@
 </p:sld>
 </file>
 
-<file path=ppt/slides/slide19.xml><?xml version="1.0" encoding="utf-8"?>
+<file path=ppt/slides/slide22.xml><?xml version="1.0" encoding="utf-8"?>
 <p:sld xmlns:a="http://schemas.openxmlformats.org/drawingml/2006/main" xmlns:r="http://schemas.openxmlformats.org/officeDocument/2006/relationships" xmlns:p="http://schemas.openxmlformats.org/presentationml/2006/main">
   <p:cSld>
     <p:spTree>
@@ -8287,7 +9840,7 @@
 </p:sld>
 </file>
 
-<file path=ppt/slides/slide2.xml><?xml version="1.0" encoding="utf-8"?>
+<file path=ppt/slides/slide23.xml><?xml version="1.0" encoding="utf-8"?>
 <p:sld xmlns:a="http://schemas.openxmlformats.org/drawingml/2006/main" xmlns:r="http://schemas.openxmlformats.org/officeDocument/2006/relationships" xmlns:p="http://schemas.openxmlformats.org/presentationml/2006/main">
   <p:cSld>
     <p:spTree>
@@ -8309,7 +9862,7 @@
           <p:cNvPr id="2" name="Title 1">
             <a:extLst>
               <a:ext uri="{FF2B5EF4-FFF2-40B4-BE49-F238E27FC236}">
-                <a16:creationId xmlns:a16="http://schemas.microsoft.com/office/drawing/2014/main" id="{4D2CC3D3-F985-4DBF-B42C-532EF5B7942E}"/>
+                <a16:creationId xmlns:a16="http://schemas.microsoft.com/office/drawing/2014/main" id="{B0AABAE2-8ED1-4D5B-8F3A-614B20E5CCC1}"/>
               </a:ext>
             </a:extLst>
           </p:cNvPr>
@@ -8327,13 +9880,8 @@
           <a:p>
             <a:r>
               <a:rPr lang="en-US" dirty="0"/>
-              <a:t>$</a:t>
-            </a:r>
-            <a:r>
-              <a:rPr lang="en-US" dirty="0" err="1"/>
-              <a:t>whoami</a:t>
-            </a:r>
-            <a:endParaRPr lang="en-US" dirty="0"/>
+              <a:t>Demo CVE-2020-25733</a:t>
+            </a:r>
           </a:p>
         </p:txBody>
       </p:sp>
@@ -8342,7 +9890,7 @@
           <p:cNvPr id="3" name="Content Placeholder 2">
             <a:extLst>
               <a:ext uri="{FF2B5EF4-FFF2-40B4-BE49-F238E27FC236}">
-                <a16:creationId xmlns:a16="http://schemas.microsoft.com/office/drawing/2014/main" id="{846FE696-0F9D-42FC-8EBC-F513EFE611B3}"/>
+                <a16:creationId xmlns:a16="http://schemas.microsoft.com/office/drawing/2014/main" id="{57950F08-A057-420E-B97A-9D5132096DCC}"/>
               </a:ext>
             </a:extLst>
           </p:cNvPr>
@@ -8353,57 +9901,58 @@
             <p:ph idx="1"/>
           </p:nvPr>
         </p:nvSpPr>
-        <p:spPr>
-          <a:xfrm>
-            <a:off x="1295401" y="2556932"/>
-            <a:ext cx="9601196" cy="3318936"/>
-          </a:xfrm>
-        </p:spPr>
+        <p:spPr/>
         <p:txBody>
           <a:bodyPr>
-            <a:normAutofit lnSpcReduction="10000"/>
+            <a:normAutofit/>
           </a:bodyPr>
           <a:lstStyle/>
           <a:p>
             <a:r>
               <a:rPr lang="en-US" dirty="0"/>
-              <a:t>TEH WIN SAM</a:t>
-            </a:r>
-          </a:p>
-          <a:p>
-            <a:r>
-              <a:rPr lang="en-US" dirty="0"/>
-              <a:t>23 (1997)</a:t>
-            </a:r>
-          </a:p>
-          <a:p>
-            <a:r>
-              <a:rPr lang="en-US" dirty="0"/>
-              <a:t>CVE HUNTER</a:t>
-            </a:r>
-          </a:p>
-          <a:p>
-            <a:r>
-              <a:rPr lang="en-US" dirty="0"/>
-              <a:t>CREST CRT,OSWE,OSCE,OSCP,CHFI,CEH,CND,SLAE64 ...</a:t>
-            </a:r>
-          </a:p>
-          <a:p>
-            <a:r>
-              <a:rPr lang="en-US" dirty="0"/>
-              <a:t>Associate at Deloitte</a:t>
-            </a:r>
-          </a:p>
-          <a:p>
-            <a:r>
-              <a:rPr lang="en-US" dirty="0"/>
-              <a:t>Bachelors of Computer Science from UOW </a:t>
-            </a:r>
-          </a:p>
-          <a:p>
-            <a:r>
-              <a:rPr lang="en-US" dirty="0"/>
-              <a:t>Graduated on July 2020</a:t>
+              <a:t>Timeline</a:t>
+            </a:r>
+          </a:p>
+          <a:p>
+            <a:pPr lvl="1"/>
+            <a:r>
+              <a:rPr lang="en-US" dirty="0"/>
+              <a:t>20/06/2020 Notified Vendor</a:t>
+            </a:r>
+          </a:p>
+          <a:p>
+            <a:pPr lvl="1"/>
+            <a:r>
+              <a:rPr lang="en-US" dirty="0"/>
+              <a:t>24/06/2020 Patch release</a:t>
+            </a:r>
+          </a:p>
+          <a:p>
+            <a:pPr lvl="1"/>
+            <a:r>
+              <a:rPr lang="en-US" dirty="0"/>
+              <a:t>24/06/2020 Patch not fixed</a:t>
+            </a:r>
+          </a:p>
+          <a:p>
+            <a:pPr lvl="1"/>
+            <a:r>
+              <a:rPr lang="en-US" dirty="0"/>
+              <a:t>24/06/2020 Request CVE-ID</a:t>
+            </a:r>
+          </a:p>
+          <a:p>
+            <a:pPr lvl="1"/>
+            <a:r>
+              <a:rPr lang="en-US" dirty="0"/>
+              <a:t>18/09/2020 no response and request CVE-ID again</a:t>
+            </a:r>
+          </a:p>
+          <a:p>
+            <a:pPr lvl="1"/>
+            <a:r>
+              <a:rPr lang="en-US" dirty="0"/>
+              <a:t>19/09/2020 Published</a:t>
             </a:r>
           </a:p>
         </p:txBody>
@@ -8411,7 +9960,7 @@
     </p:spTree>
     <p:extLst>
       <p:ext uri="{BB962C8B-B14F-4D97-AF65-F5344CB8AC3E}">
-        <p14:creationId xmlns:p14="http://schemas.microsoft.com/office/powerpoint/2010/main" val="3238377738"/>
+        <p14:creationId xmlns:p14="http://schemas.microsoft.com/office/powerpoint/2010/main" val="2538880931"/>
       </p:ext>
     </p:extLst>
   </p:cSld>
@@ -8421,7 +9970,7 @@
 </p:sld>
 </file>
 
-<file path=ppt/slides/slide20.xml><?xml version="1.0" encoding="utf-8"?>
+<file path=ppt/slides/slide24.xml><?xml version="1.0" encoding="utf-8"?>
 <p:sld xmlns:a="http://schemas.openxmlformats.org/drawingml/2006/main" xmlns:r="http://schemas.openxmlformats.org/officeDocument/2006/relationships" xmlns:p="http://schemas.openxmlformats.org/presentationml/2006/main">
   <p:cSld>
     <p:spTree>
@@ -8443,136 +9992,6 @@
           <p:cNvPr id="2" name="Title 1">
             <a:extLst>
               <a:ext uri="{FF2B5EF4-FFF2-40B4-BE49-F238E27FC236}">
-                <a16:creationId xmlns:a16="http://schemas.microsoft.com/office/drawing/2014/main" id="{B0AABAE2-8ED1-4D5B-8F3A-614B20E5CCC1}"/>
-              </a:ext>
-            </a:extLst>
-          </p:cNvPr>
-          <p:cNvSpPr>
-            <a:spLocks noGrp="1"/>
-          </p:cNvSpPr>
-          <p:nvPr>
-            <p:ph type="title"/>
-          </p:nvPr>
-        </p:nvSpPr>
-        <p:spPr/>
-        <p:txBody>
-          <a:bodyPr/>
-          <a:lstStyle/>
-          <a:p>
-            <a:r>
-              <a:rPr lang="en-US" dirty="0"/>
-              <a:t>Demo CVE-2020-25733</a:t>
-            </a:r>
-          </a:p>
-        </p:txBody>
-      </p:sp>
-      <p:sp>
-        <p:nvSpPr>
-          <p:cNvPr id="3" name="Content Placeholder 2">
-            <a:extLst>
-              <a:ext uri="{FF2B5EF4-FFF2-40B4-BE49-F238E27FC236}">
-                <a16:creationId xmlns:a16="http://schemas.microsoft.com/office/drawing/2014/main" id="{57950F08-A057-420E-B97A-9D5132096DCC}"/>
-              </a:ext>
-            </a:extLst>
-          </p:cNvPr>
-          <p:cNvSpPr>
-            <a:spLocks noGrp="1"/>
-          </p:cNvSpPr>
-          <p:nvPr>
-            <p:ph idx="1"/>
-          </p:nvPr>
-        </p:nvSpPr>
-        <p:spPr/>
-        <p:txBody>
-          <a:bodyPr>
-            <a:normAutofit/>
-          </a:bodyPr>
-          <a:lstStyle/>
-          <a:p>
-            <a:r>
-              <a:rPr lang="en-US" dirty="0"/>
-              <a:t>Timeline</a:t>
-            </a:r>
-          </a:p>
-          <a:p>
-            <a:pPr lvl="1"/>
-            <a:r>
-              <a:rPr lang="en-US" dirty="0"/>
-              <a:t>20/06/2020 Notified Vendor</a:t>
-            </a:r>
-          </a:p>
-          <a:p>
-            <a:pPr lvl="1"/>
-            <a:r>
-              <a:rPr lang="en-US" dirty="0"/>
-              <a:t>24/06/2020 Patch release</a:t>
-            </a:r>
-          </a:p>
-          <a:p>
-            <a:pPr lvl="1"/>
-            <a:r>
-              <a:rPr lang="en-US" dirty="0"/>
-              <a:t>24/06/2020 Patch not fixed</a:t>
-            </a:r>
-          </a:p>
-          <a:p>
-            <a:pPr lvl="1"/>
-            <a:r>
-              <a:rPr lang="en-US" dirty="0"/>
-              <a:t>24/06/2020 Request CVE-ID</a:t>
-            </a:r>
-          </a:p>
-          <a:p>
-            <a:pPr lvl="1"/>
-            <a:r>
-              <a:rPr lang="en-US" dirty="0"/>
-              <a:t>18/09/2020 no response and request CVE-ID again</a:t>
-            </a:r>
-          </a:p>
-          <a:p>
-            <a:pPr lvl="1"/>
-            <a:r>
-              <a:rPr lang="en-US" dirty="0"/>
-              <a:t>19/09/2020 Published</a:t>
-            </a:r>
-          </a:p>
-        </p:txBody>
-      </p:sp>
-    </p:spTree>
-    <p:extLst>
-      <p:ext uri="{BB962C8B-B14F-4D97-AF65-F5344CB8AC3E}">
-        <p14:creationId xmlns:p14="http://schemas.microsoft.com/office/powerpoint/2010/main" val="2538880931"/>
-      </p:ext>
-    </p:extLst>
-  </p:cSld>
-  <p:clrMapOvr>
-    <a:masterClrMapping/>
-  </p:clrMapOvr>
-</p:sld>
-</file>
-
-<file path=ppt/slides/slide21.xml><?xml version="1.0" encoding="utf-8"?>
-<p:sld xmlns:a="http://schemas.openxmlformats.org/drawingml/2006/main" xmlns:r="http://schemas.openxmlformats.org/officeDocument/2006/relationships" xmlns:p="http://schemas.openxmlformats.org/presentationml/2006/main">
-  <p:cSld>
-    <p:spTree>
-      <p:nvGrpSpPr>
-        <p:cNvPr id="1" name=""/>
-        <p:cNvGrpSpPr/>
-        <p:nvPr/>
-      </p:nvGrpSpPr>
-      <p:grpSpPr>
-        <a:xfrm>
-          <a:off x="0" y="0"/>
-          <a:ext cx="0" cy="0"/>
-          <a:chOff x="0" y="0"/>
-          <a:chExt cx="0" cy="0"/>
-        </a:xfrm>
-      </p:grpSpPr>
-      <p:sp>
-        <p:nvSpPr>
-          <p:cNvPr id="2" name="Title 1">
-            <a:extLst>
-              <a:ext uri="{FF2B5EF4-FFF2-40B4-BE49-F238E27FC236}">
                 <a16:creationId xmlns:a16="http://schemas.microsoft.com/office/drawing/2014/main" id="{61A9ACAD-D4BB-4604-B7E2-461F54C689E4}"/>
               </a:ext>
             </a:extLst>
@@ -8653,14 +10072,18 @@
           </a:p>
           <a:p>
             <a:r>
+              <a:rPr lang="pt-BR" b="1" dirty="0"/>
+              <a:t>CVSS:3.1/AV:N/AC:L/PR:N/UI:N/S:U/C:L/I:N/A:N</a:t>
+            </a:r>
+          </a:p>
+          <a:p>
+            <a:r>
               <a:rPr lang="en-US" b="1" dirty="0"/>
-              <a:t>CVSS 3.1 Unknown</a:t>
-            </a:r>
-          </a:p>
-          <a:p>
-            <a:r>
-              <a:rPr lang="en-US" b="1" dirty="0"/>
-              <a:t>CVSS 2.0 Unknown </a:t>
+              <a:t>CVSS 2.0/</a:t>
+            </a:r>
+            <a:r>
+              <a:rPr lang="pt-BR" b="1" dirty="0"/>
+              <a:t>AV:N/AC:L/Au:N/C:P/I:N/A:N</a:t>
             </a:r>
           </a:p>
           <a:p>
@@ -8696,7 +10119,7 @@
         </p:blipFill>
         <p:spPr>
           <a:xfrm>
-            <a:off x="141448" y="1166705"/>
+            <a:off x="253402" y="1056318"/>
             <a:ext cx="11909101" cy="4985006"/>
           </a:xfrm>
           <a:prstGeom prst="rect">
@@ -8706,10 +10129,10 @@
       </p:pic>
       <p:pic>
         <p:nvPicPr>
-          <p:cNvPr id="5" name="Picture 4">
+          <p:cNvPr id="7" name="Picture 6">
             <a:extLst>
               <a:ext uri="{FF2B5EF4-FFF2-40B4-BE49-F238E27FC236}">
-                <a16:creationId xmlns:a16="http://schemas.microsoft.com/office/drawing/2014/main" id="{C4735B40-BCC1-42EB-8480-45DB1B1F460D}"/>
+                <a16:creationId xmlns:a16="http://schemas.microsoft.com/office/drawing/2014/main" id="{B14393C1-832B-4440-AEA2-7166618CDCAB}"/>
               </a:ext>
             </a:extLst>
           </p:cNvPr>
@@ -8726,8 +10149,8 @@
         </p:blipFill>
         <p:spPr>
           <a:xfrm>
-            <a:off x="2006388" y="1675873"/>
-            <a:ext cx="8179220" cy="4000706"/>
+            <a:off x="1643989" y="1848462"/>
+            <a:ext cx="8601224" cy="3617027"/>
           </a:xfrm>
           <a:prstGeom prst="rect">
             <a:avLst/>
@@ -8864,7 +10287,7 @@
                             </p:stCondLst>
                             <p:childTnLst>
                               <p:par>
-                                <p:cTn id="12" presetID="47" presetClass="entr" presetSubtype="0" fill="hold" nodeType="clickEffect">
+                                <p:cTn id="12" presetID="22" presetClass="entr" presetSubtype="4" fill="hold" nodeType="clickEffect">
                                   <p:stCondLst>
                                     <p:cond delay="0"/>
                                   </p:stCondLst>
@@ -8877,7 +10300,7 @@
                                           </p:stCondLst>
                                         </p:cTn>
                                         <p:tgtEl>
-                                          <p:spTgt spid="5"/>
+                                          <p:spTgt spid="7"/>
                                         </p:tgtEl>
                                         <p:attrNameLst>
                                           <p:attrName>style.visibility</p:attrName>
@@ -8887,60 +10310,14 @@
                                         <p:strVal val="visible"/>
                                       </p:to>
                                     </p:set>
-                                    <p:animEffect transition="in" filter="fade">
+                                    <p:animEffect transition="in" filter="wipe(down)">
                                       <p:cBhvr>
-                                        <p:cTn id="14" dur="1000"/>
+                                        <p:cTn id="14" dur="500"/>
                                         <p:tgtEl>
-                                          <p:spTgt spid="5"/>
+                                          <p:spTgt spid="7"/>
                                         </p:tgtEl>
                                       </p:cBhvr>
                                     </p:animEffect>
-                                    <p:anim calcmode="lin" valueType="num">
-                                      <p:cBhvr>
-                                        <p:cTn id="15" dur="1000" fill="hold"/>
-                                        <p:tgtEl>
-                                          <p:spTgt spid="5"/>
-                                        </p:tgtEl>
-                                        <p:attrNameLst>
-                                          <p:attrName>ppt_x</p:attrName>
-                                        </p:attrNameLst>
-                                      </p:cBhvr>
-                                      <p:tavLst>
-                                        <p:tav tm="0">
-                                          <p:val>
-                                            <p:strVal val="#ppt_x"/>
-                                          </p:val>
-                                        </p:tav>
-                                        <p:tav tm="100000">
-                                          <p:val>
-                                            <p:strVal val="#ppt_x"/>
-                                          </p:val>
-                                        </p:tav>
-                                      </p:tavLst>
-                                    </p:anim>
-                                    <p:anim calcmode="lin" valueType="num">
-                                      <p:cBhvr>
-                                        <p:cTn id="16" dur="1000" fill="hold"/>
-                                        <p:tgtEl>
-                                          <p:spTgt spid="5"/>
-                                        </p:tgtEl>
-                                        <p:attrNameLst>
-                                          <p:attrName>ppt_y</p:attrName>
-                                        </p:attrNameLst>
-                                      </p:cBhvr>
-                                      <p:tavLst>
-                                        <p:tav tm="0">
-                                          <p:val>
-                                            <p:strVal val="#ppt_y-.1"/>
-                                          </p:val>
-                                        </p:tav>
-                                        <p:tav tm="100000">
-                                          <p:val>
-                                            <p:strVal val="#ppt_y"/>
-                                          </p:val>
-                                        </p:tav>
-                                      </p:tavLst>
-                                    </p:anim>
                                   </p:childTnLst>
                                 </p:cTn>
                               </p:par>
@@ -8975,7 +10352,7 @@
 </p:sld>
 </file>
 
-<file path=ppt/slides/slide22.xml><?xml version="1.0" encoding="utf-8"?>
+<file path=ppt/slides/slide25.xml><?xml version="1.0" encoding="utf-8"?>
 <p:sld xmlns:a="http://schemas.openxmlformats.org/drawingml/2006/main" xmlns:r="http://schemas.openxmlformats.org/officeDocument/2006/relationships" xmlns:p="http://schemas.openxmlformats.org/presentationml/2006/main">
   <p:cSld>
     <p:spTree>
@@ -9103,7 +10480,7 @@
 </p:sld>
 </file>
 
-<file path=ppt/slides/slide23.xml><?xml version="1.0" encoding="utf-8"?>
+<file path=ppt/slides/slide26.xml><?xml version="1.0" encoding="utf-8"?>
 <p:sld xmlns:a="http://schemas.openxmlformats.org/drawingml/2006/main" xmlns:r="http://schemas.openxmlformats.org/officeDocument/2006/relationships" xmlns:p="http://schemas.openxmlformats.org/presentationml/2006/main">
   <p:cSld>
     <p:spTree>
@@ -10158,7 +11535,7 @@
 </p:sld>
 </file>
 
-<file path=ppt/slides/slide24.xml><?xml version="1.0" encoding="utf-8"?>
+<file path=ppt/slides/slide27.xml><?xml version="1.0" encoding="utf-8"?>
 <p:sld xmlns:a="http://schemas.openxmlformats.org/drawingml/2006/main" xmlns:r="http://schemas.openxmlformats.org/officeDocument/2006/relationships" xmlns:p="http://schemas.openxmlformats.org/presentationml/2006/main">
   <p:cSld>
     <p:spTree>
@@ -10604,7 +11981,7 @@
 </p:sld>
 </file>
 
-<file path=ppt/slides/slide25.xml><?xml version="1.0" encoding="utf-8"?>
+<file path=ppt/slides/slide28.xml><?xml version="1.0" encoding="utf-8"?>
 <p:sld xmlns:a="http://schemas.openxmlformats.org/drawingml/2006/main" xmlns:r="http://schemas.openxmlformats.org/officeDocument/2006/relationships" xmlns:p="http://schemas.openxmlformats.org/presentationml/2006/main">
   <p:cSld>
     <p:spTree>
@@ -11083,7 +12460,7 @@
           <a:p>
             <a:r>
               <a:rPr lang="en-US" dirty="0"/>
-              <a:t>Case Studies </a:t>
+              <a:t>Case Studies Write-Up </a:t>
             </a:r>
           </a:p>
         </p:txBody>
@@ -11111,7 +12488,9 @@
           </a:xfrm>
         </p:spPr>
         <p:txBody>
-          <a:bodyPr/>
+          <a:bodyPr>
+            <a:normAutofit/>
+          </a:bodyPr>
           <a:lstStyle/>
           <a:p>
             <a:r>
@@ -11133,21 +12512,8 @@
                   <a:srgbClr val="FF0000"/>
                 </a:solidFill>
               </a:rPr>
-              <a:t>*vendor claim that it’s not vulnerability but feature, will see </a:t>
-            </a:r>
-            <a:r>
-              <a:rPr lang="en-US">
-                <a:solidFill>
-                  <a:srgbClr val="FF0000"/>
-                </a:solidFill>
-              </a:rPr>
-              <a:t>this later*</a:t>
-            </a:r>
-            <a:endParaRPr lang="en-US" dirty="0">
-              <a:solidFill>
-                <a:srgbClr val="FF0000"/>
-              </a:solidFill>
-            </a:endParaRPr>
+              <a:t>*vendor claim that it’s not vulnerability but feature, will see this later*</a:t>
+            </a:r>
           </a:p>
           <a:p>
             <a:r>
@@ -11164,7 +12530,15 @@
           <a:p>
             <a:r>
               <a:rPr lang="en-US" dirty="0"/>
-              <a:t>Bonus ? Maybe zero day? </a:t>
+              <a:t>Bonus ? RCE/</a:t>
+            </a:r>
+            <a:r>
+              <a:rPr lang="en-US" dirty="0" err="1"/>
+              <a:t>SQLi</a:t>
+            </a:r>
+            <a:r>
+              <a:rPr lang="en-US" dirty="0"/>
+              <a:t> in my College (INTI Subang) ?</a:t>
             </a:r>
           </a:p>
         </p:txBody>
@@ -11483,7 +12857,11 @@
           <a:p>
             <a:r>
               <a:rPr lang="en-US" dirty="0"/>
-              <a:t>Vulnerable : Stored and Reflected Cross Site Scripting (XSS)</a:t>
+              <a:t>Vulnerable : Stored and Reflected Cross Site Scripting (XSS) </a:t>
+            </a:r>
+            <a:r>
+              <a:rPr lang="en-US" b="1" i="1" dirty="0"/>
+              <a:t>TO RCE</a:t>
             </a:r>
           </a:p>
           <a:p>
@@ -11507,37 +12885,17 @@
           <a:p>
             <a:r>
               <a:rPr lang="en-US" b="1" dirty="0"/>
-              <a:t>CVSS 9.6</a:t>
-            </a:r>
-            <a:r>
-              <a:rPr lang="en-US" b="1" dirty="0">
-                <a:solidFill>
-                  <a:srgbClr val="FF0000"/>
-                </a:solidFill>
-              </a:rPr>
-              <a:t> Critical </a:t>
-            </a:r>
-            <a:r>
-              <a:rPr lang="pt-BR" dirty="0"/>
+              <a:t>CVSS:3.1/</a:t>
+            </a:r>
+            <a:r>
+              <a:rPr lang="pt-BR" b="1" dirty="0"/>
               <a:t>AV:N/AC:L/PR:N/UI:R/S:C/C:H/I:H/A:H</a:t>
             </a:r>
             <a:endParaRPr lang="en-US" b="1" dirty="0"/>
           </a:p>
           <a:p>
             <a:r>
-              <a:rPr lang="en-US" b="1" dirty="0"/>
-              <a:t>CVSS 9.2 </a:t>
-            </a:r>
-            <a:r>
-              <a:rPr lang="en-US" b="1" dirty="0">
-                <a:solidFill>
-                  <a:srgbClr val="FF0000"/>
-                </a:solidFill>
-              </a:rPr>
-              <a:t>High </a:t>
-            </a:r>
-            <a:r>
-              <a:rPr lang="pt-BR" dirty="0"/>
+              <a:rPr lang="pt-BR" b="1" dirty="0"/>
               <a:t>AV:N/AC:M/Au:N/C:C/I:C/A:C</a:t>
             </a:r>
           </a:p>
@@ -11571,7 +12929,7 @@
         </p:blipFill>
         <p:spPr>
           <a:xfrm>
-            <a:off x="120030" y="1219764"/>
+            <a:off x="0" y="939672"/>
             <a:ext cx="11828130" cy="4978656"/>
           </a:xfrm>
           <a:prstGeom prst="rect">
@@ -11601,7 +12959,7 @@
         </p:blipFill>
         <p:spPr>
           <a:xfrm>
-            <a:off x="2209054" y="1679967"/>
+            <a:off x="2022264" y="1376651"/>
             <a:ext cx="8147469" cy="3886400"/>
           </a:xfrm>
           <a:prstGeom prst="rect">
@@ -12188,4 +13546,299 @@
     </a:ext>
   </a:extLst>
 </a:theme>
+</file>
+
+<file path=ppt/theme/theme2.xml><?xml version="1.0" encoding="utf-8"?>
+<a:theme xmlns:a="http://schemas.openxmlformats.org/drawingml/2006/main" name="Office Theme">
+  <a:themeElements>
+    <a:clrScheme name="Office">
+      <a:dk1>
+        <a:sysClr val="windowText" lastClr="000000"/>
+      </a:dk1>
+      <a:lt1>
+        <a:sysClr val="window" lastClr="FFFFFF"/>
+      </a:lt1>
+      <a:dk2>
+        <a:srgbClr val="44546A"/>
+      </a:dk2>
+      <a:lt2>
+        <a:srgbClr val="E7E6E6"/>
+      </a:lt2>
+      <a:accent1>
+        <a:srgbClr val="4472C4"/>
+      </a:accent1>
+      <a:accent2>
+        <a:srgbClr val="ED7D31"/>
+      </a:accent2>
+      <a:accent3>
+        <a:srgbClr val="A5A5A5"/>
+      </a:accent3>
+      <a:accent4>
+        <a:srgbClr val="FFC000"/>
+      </a:accent4>
+      <a:accent5>
+        <a:srgbClr val="5B9BD5"/>
+      </a:accent5>
+      <a:accent6>
+        <a:srgbClr val="70AD47"/>
+      </a:accent6>
+      <a:hlink>
+        <a:srgbClr val="0563C1"/>
+      </a:hlink>
+      <a:folHlink>
+        <a:srgbClr val="954F72"/>
+      </a:folHlink>
+    </a:clrScheme>
+    <a:fontScheme name="Office">
+      <a:majorFont>
+        <a:latin typeface="Calibri Light" panose="020F0302020204030204"/>
+        <a:ea typeface=""/>
+        <a:cs typeface=""/>
+        <a:font script="Jpan" typeface="游ゴシック Light"/>
+        <a:font script="Hang" typeface="맑은 고딕"/>
+        <a:font script="Hans" typeface="等线 Light"/>
+        <a:font script="Hant" typeface="新細明體"/>
+        <a:font script="Arab" typeface="Times New Roman"/>
+        <a:font script="Hebr" typeface="Times New Roman"/>
+        <a:font script="Thai" typeface="Angsana New"/>
+        <a:font script="Ethi" typeface="Nyala"/>
+        <a:font script="Beng" typeface="Vrinda"/>
+        <a:font script="Gujr" typeface="Shruti"/>
+        <a:font script="Khmr" typeface="MoolBoran"/>
+        <a:font script="Knda" typeface="Tunga"/>
+        <a:font script="Guru" typeface="Raavi"/>
+        <a:font script="Cans" typeface="Euphemia"/>
+        <a:font script="Cher" typeface="Plantagenet Cherokee"/>
+        <a:font script="Yiii" typeface="Microsoft Yi Baiti"/>
+        <a:font script="Tibt" typeface="Microsoft Himalaya"/>
+        <a:font script="Thaa" typeface="MV Boli"/>
+        <a:font script="Deva" typeface="Mangal"/>
+        <a:font script="Telu" typeface="Gautami"/>
+        <a:font script="Taml" typeface="Latha"/>
+        <a:font script="Syrc" typeface="Estrangelo Edessa"/>
+        <a:font script="Orya" typeface="Kalinga"/>
+        <a:font script="Mlym" typeface="Kartika"/>
+        <a:font script="Laoo" typeface="DokChampa"/>
+        <a:font script="Sinh" typeface="Iskoola Pota"/>
+        <a:font script="Mong" typeface="Mongolian Baiti"/>
+        <a:font script="Viet" typeface="Times New Roman"/>
+        <a:font script="Uigh" typeface="Microsoft Uighur"/>
+        <a:font script="Geor" typeface="Sylfaen"/>
+        <a:font script="Armn" typeface="Arial"/>
+        <a:font script="Bugi" typeface="Leelawadee UI"/>
+        <a:font script="Bopo" typeface="Microsoft JhengHei"/>
+        <a:font script="Java" typeface="Javanese Text"/>
+        <a:font script="Lisu" typeface="Segoe UI"/>
+        <a:font script="Mymr" typeface="Myanmar Text"/>
+        <a:font script="Nkoo" typeface="Ebrima"/>
+        <a:font script="Olck" typeface="Nirmala UI"/>
+        <a:font script="Osma" typeface="Ebrima"/>
+        <a:font script="Phag" typeface="Phagspa"/>
+        <a:font script="Syrn" typeface="Estrangelo Edessa"/>
+        <a:font script="Syrj" typeface="Estrangelo Edessa"/>
+        <a:font script="Syre" typeface="Estrangelo Edessa"/>
+        <a:font script="Sora" typeface="Nirmala UI"/>
+        <a:font script="Tale" typeface="Microsoft Tai Le"/>
+        <a:font script="Talu" typeface="Microsoft New Tai Lue"/>
+        <a:font script="Tfng" typeface="Ebrima"/>
+      </a:majorFont>
+      <a:minorFont>
+        <a:latin typeface="Calibri" panose="020F0502020204030204"/>
+        <a:ea typeface=""/>
+        <a:cs typeface=""/>
+        <a:font script="Jpan" typeface="游ゴシック"/>
+        <a:font script="Hang" typeface="맑은 고딕"/>
+        <a:font script="Hans" typeface="等线"/>
+        <a:font script="Hant" typeface="新細明體"/>
+        <a:font script="Arab" typeface="Arial"/>
+        <a:font script="Hebr" typeface="Arial"/>
+        <a:font script="Thai" typeface="Cordia New"/>
+        <a:font script="Ethi" typeface="Nyala"/>
+        <a:font script="Beng" typeface="Vrinda"/>
+        <a:font script="Gujr" typeface="Shruti"/>
+        <a:font script="Khmr" typeface="DaunPenh"/>
+        <a:font script="Knda" typeface="Tunga"/>
+        <a:font script="Guru" typeface="Raavi"/>
+        <a:font script="Cans" typeface="Euphemia"/>
+        <a:font script="Cher" typeface="Plantagenet Cherokee"/>
+        <a:font script="Yiii" typeface="Microsoft Yi Baiti"/>
+        <a:font script="Tibt" typeface="Microsoft Himalaya"/>
+        <a:font script="Thaa" typeface="MV Boli"/>
+        <a:font script="Deva" typeface="Mangal"/>
+        <a:font script="Telu" typeface="Gautami"/>
+        <a:font script="Taml" typeface="Latha"/>
+        <a:font script="Syrc" typeface="Estrangelo Edessa"/>
+        <a:font script="Orya" typeface="Kalinga"/>
+        <a:font script="Mlym" typeface="Kartika"/>
+        <a:font script="Laoo" typeface="DokChampa"/>
+        <a:font script="Sinh" typeface="Iskoola Pota"/>
+        <a:font script="Mong" typeface="Mongolian Baiti"/>
+        <a:font script="Viet" typeface="Arial"/>
+        <a:font script="Uigh" typeface="Microsoft Uighur"/>
+        <a:font script="Geor" typeface="Sylfaen"/>
+        <a:font script="Armn" typeface="Arial"/>
+        <a:font script="Bugi" typeface="Leelawadee UI"/>
+        <a:font script="Bopo" typeface="Microsoft JhengHei"/>
+        <a:font script="Java" typeface="Javanese Text"/>
+        <a:font script="Lisu" typeface="Segoe UI"/>
+        <a:font script="Mymr" typeface="Myanmar Text"/>
+        <a:font script="Nkoo" typeface="Ebrima"/>
+        <a:font script="Olck" typeface="Nirmala UI"/>
+        <a:font script="Osma" typeface="Ebrima"/>
+        <a:font script="Phag" typeface="Phagspa"/>
+        <a:font script="Syrn" typeface="Estrangelo Edessa"/>
+        <a:font script="Syrj" typeface="Estrangelo Edessa"/>
+        <a:font script="Syre" typeface="Estrangelo Edessa"/>
+        <a:font script="Sora" typeface="Nirmala UI"/>
+        <a:font script="Tale" typeface="Microsoft Tai Le"/>
+        <a:font script="Talu" typeface="Microsoft New Tai Lue"/>
+        <a:font script="Tfng" typeface="Ebrima"/>
+      </a:minorFont>
+    </a:fontScheme>
+    <a:fmtScheme name="Office">
+      <a:fillStyleLst>
+        <a:solidFill>
+          <a:schemeClr val="phClr"/>
+        </a:solidFill>
+        <a:gradFill rotWithShape="1">
+          <a:gsLst>
+            <a:gs pos="0">
+              <a:schemeClr val="phClr">
+                <a:lumMod val="110000"/>
+                <a:satMod val="105000"/>
+                <a:tint val="67000"/>
+              </a:schemeClr>
+            </a:gs>
+            <a:gs pos="50000">
+              <a:schemeClr val="phClr">
+                <a:lumMod val="105000"/>
+                <a:satMod val="103000"/>
+                <a:tint val="73000"/>
+              </a:schemeClr>
+            </a:gs>
+            <a:gs pos="100000">
+              <a:schemeClr val="phClr">
+                <a:lumMod val="105000"/>
+                <a:satMod val="109000"/>
+                <a:tint val="81000"/>
+              </a:schemeClr>
+            </a:gs>
+          </a:gsLst>
+          <a:lin ang="5400000" scaled="0"/>
+        </a:gradFill>
+        <a:gradFill rotWithShape="1">
+          <a:gsLst>
+            <a:gs pos="0">
+              <a:schemeClr val="phClr">
+                <a:satMod val="103000"/>
+                <a:lumMod val="102000"/>
+                <a:tint val="94000"/>
+              </a:schemeClr>
+            </a:gs>
+            <a:gs pos="50000">
+              <a:schemeClr val="phClr">
+                <a:satMod val="110000"/>
+                <a:lumMod val="100000"/>
+                <a:shade val="100000"/>
+              </a:schemeClr>
+            </a:gs>
+            <a:gs pos="100000">
+              <a:schemeClr val="phClr">
+                <a:lumMod val="99000"/>
+                <a:satMod val="120000"/>
+                <a:shade val="78000"/>
+              </a:schemeClr>
+            </a:gs>
+          </a:gsLst>
+          <a:lin ang="5400000" scaled="0"/>
+        </a:gradFill>
+      </a:fillStyleLst>
+      <a:lnStyleLst>
+        <a:ln w="6350" cap="flat" cmpd="sng" algn="ctr">
+          <a:solidFill>
+            <a:schemeClr val="phClr"/>
+          </a:solidFill>
+          <a:prstDash val="solid"/>
+          <a:miter lim="800000"/>
+        </a:ln>
+        <a:ln w="12700" cap="flat" cmpd="sng" algn="ctr">
+          <a:solidFill>
+            <a:schemeClr val="phClr"/>
+          </a:solidFill>
+          <a:prstDash val="solid"/>
+          <a:miter lim="800000"/>
+        </a:ln>
+        <a:ln w="19050" cap="flat" cmpd="sng" algn="ctr">
+          <a:solidFill>
+            <a:schemeClr val="phClr"/>
+          </a:solidFill>
+          <a:prstDash val="solid"/>
+          <a:miter lim="800000"/>
+        </a:ln>
+      </a:lnStyleLst>
+      <a:effectStyleLst>
+        <a:effectStyle>
+          <a:effectLst/>
+        </a:effectStyle>
+        <a:effectStyle>
+          <a:effectLst/>
+        </a:effectStyle>
+        <a:effectStyle>
+          <a:effectLst>
+            <a:outerShdw blurRad="57150" dist="19050" dir="5400000" algn="ctr" rotWithShape="0">
+              <a:srgbClr val="000000">
+                <a:alpha val="63000"/>
+              </a:srgbClr>
+            </a:outerShdw>
+          </a:effectLst>
+        </a:effectStyle>
+      </a:effectStyleLst>
+      <a:bgFillStyleLst>
+        <a:solidFill>
+          <a:schemeClr val="phClr"/>
+        </a:solidFill>
+        <a:solidFill>
+          <a:schemeClr val="phClr">
+            <a:tint val="95000"/>
+            <a:satMod val="170000"/>
+          </a:schemeClr>
+        </a:solidFill>
+        <a:gradFill rotWithShape="1">
+          <a:gsLst>
+            <a:gs pos="0">
+              <a:schemeClr val="phClr">
+                <a:tint val="93000"/>
+                <a:satMod val="150000"/>
+                <a:shade val="98000"/>
+                <a:lumMod val="102000"/>
+              </a:schemeClr>
+            </a:gs>
+            <a:gs pos="50000">
+              <a:schemeClr val="phClr">
+                <a:tint val="98000"/>
+                <a:satMod val="130000"/>
+                <a:shade val="90000"/>
+                <a:lumMod val="103000"/>
+              </a:schemeClr>
+            </a:gs>
+            <a:gs pos="100000">
+              <a:schemeClr val="phClr">
+                <a:shade val="63000"/>
+                <a:satMod val="120000"/>
+              </a:schemeClr>
+            </a:gs>
+          </a:gsLst>
+          <a:lin ang="5400000" scaled="0"/>
+        </a:gradFill>
+      </a:bgFillStyleLst>
+    </a:fmtScheme>
+  </a:themeElements>
+  <a:objectDefaults/>
+  <a:extraClrSchemeLst/>
+  <a:extLst>
+    <a:ext uri="{05A4C25C-085E-4340-85A3-A5531E510DB2}">
+      <thm15:themeFamily xmlns:thm15="http://schemas.microsoft.com/office/thememl/2012/main" name="Office Theme" id="{62F939B6-93AF-4DB8-9C6B-D6C7DFDC589F}" vid="{4A3C46E8-61CC-4603-A589-7422A47A8E4A}"/>
+    </a:ext>
+  </a:extLst>
+</a:theme>
 </file>
</xml_diff>